<commit_message>
Sep 23 Lecture Update
</commit_message>
<xml_diff>
--- a/Teaching/Chemistry/Labs/FCC Chem 3A Expt 5a Empirical Formula.pptx
+++ b/Teaching/Chemistry/Labs/FCC Chem 3A Expt 5a Empirical Formula.pptx
@@ -5,22 +5,28 @@
     <p:sldMasterId id="2147483803" r:id="rId1"/>
   </p:sldMasterIdLst>
   <p:notesMasterIdLst>
-    <p:notesMasterId r:id="rId15"/>
+    <p:notesMasterId r:id="rId21"/>
   </p:notesMasterIdLst>
   <p:sldIdLst>
     <p:sldId id="608" r:id="rId2"/>
     <p:sldId id="609" r:id="rId3"/>
     <p:sldId id="616" r:id="rId4"/>
-    <p:sldId id="618" r:id="rId5"/>
+    <p:sldId id="624" r:id="rId5"/>
     <p:sldId id="619" r:id="rId6"/>
-    <p:sldId id="620" r:id="rId7"/>
-    <p:sldId id="613" r:id="rId8"/>
-    <p:sldId id="610" r:id="rId9"/>
-    <p:sldId id="617" r:id="rId10"/>
-    <p:sldId id="622" r:id="rId11"/>
-    <p:sldId id="621" r:id="rId12"/>
-    <p:sldId id="623" r:id="rId13"/>
+    <p:sldId id="613" r:id="rId7"/>
+    <p:sldId id="610" r:id="rId8"/>
+    <p:sldId id="625" r:id="rId9"/>
+    <p:sldId id="633" r:id="rId10"/>
+    <p:sldId id="617" r:id="rId11"/>
+    <p:sldId id="622" r:id="rId12"/>
+    <p:sldId id="626" r:id="rId13"/>
     <p:sldId id="612" r:id="rId14"/>
+    <p:sldId id="627" r:id="rId15"/>
+    <p:sldId id="628" r:id="rId16"/>
+    <p:sldId id="629" r:id="rId17"/>
+    <p:sldId id="630" r:id="rId18"/>
+    <p:sldId id="631" r:id="rId19"/>
+    <p:sldId id="632" r:id="rId20"/>
   </p:sldIdLst>
   <p:sldSz cx="9144000" cy="6858000" type="screen4x3"/>
   <p:notesSz cx="7315200" cy="9601200"/>
@@ -10488,6 +10494,278 @@
         <p:cNvPr id="1" name="">
           <a:extLst>
             <a:ext uri="{FF2B5EF4-FFF2-40B4-BE49-F238E27FC236}">
+              <a16:creationId xmlns:a16="http://schemas.microsoft.com/office/drawing/2014/main" id="{4EB46B47-6540-F52F-1F64-854396E70E55}"/>
+            </a:ext>
+          </a:extLst>
+        </p:cNvPr>
+        <p:cNvGrpSpPr/>
+        <p:nvPr/>
+      </p:nvGrpSpPr>
+      <p:grpSpPr>
+        <a:xfrm>
+          <a:off x="0" y="0"/>
+          <a:ext cx="0" cy="0"/>
+          <a:chOff x="0" y="0"/>
+          <a:chExt cx="0" cy="0"/>
+        </a:xfrm>
+      </p:grpSpPr>
+      <p:sp>
+        <p:nvSpPr>
+          <p:cNvPr id="2" name="Title 1">
+            <a:extLst>
+              <a:ext uri="{FF2B5EF4-FFF2-40B4-BE49-F238E27FC236}">
+                <a16:creationId xmlns:a16="http://schemas.microsoft.com/office/drawing/2014/main" id="{F6F2263F-7C9A-1678-6FE0-453CEF2400AF}"/>
+              </a:ext>
+            </a:extLst>
+          </p:cNvPr>
+          <p:cNvSpPr>
+            <a:spLocks noGrp="1"/>
+          </p:cNvSpPr>
+          <p:nvPr>
+            <p:ph type="title"/>
+          </p:nvPr>
+        </p:nvSpPr>
+        <p:spPr>
+          <a:xfrm>
+            <a:off x="338666" y="183025"/>
+            <a:ext cx="8421512" cy="769441"/>
+          </a:xfrm>
+        </p:spPr>
+        <p:txBody>
+          <a:bodyPr/>
+          <a:lstStyle/>
+          <a:p>
+            <a:r>
+              <a:rPr lang="en-US" sz="4400" dirty="0"/>
+              <a:t>Procedure</a:t>
+            </a:r>
+          </a:p>
+        </p:txBody>
+      </p:sp>
+      <p:sp>
+        <p:nvSpPr>
+          <p:cNvPr id="6" name="Content Placeholder 5">
+            <a:extLst>
+              <a:ext uri="{FF2B5EF4-FFF2-40B4-BE49-F238E27FC236}">
+                <a16:creationId xmlns:a16="http://schemas.microsoft.com/office/drawing/2014/main" id="{003BDB66-1E78-B72D-677D-D6B5050E2008}"/>
+              </a:ext>
+            </a:extLst>
+          </p:cNvPr>
+          <p:cNvSpPr>
+            <a:spLocks noGrp="1"/>
+          </p:cNvSpPr>
+          <p:nvPr>
+            <p:ph idx="1"/>
+          </p:nvPr>
+        </p:nvSpPr>
+        <p:spPr>
+          <a:xfrm>
+            <a:off x="372533" y="952466"/>
+            <a:ext cx="8387645" cy="5595089"/>
+          </a:xfrm>
+        </p:spPr>
+        <p:txBody>
+          <a:bodyPr/>
+          <a:lstStyle/>
+          <a:p>
+            <a:pPr marL="0" indent="0">
+              <a:buNone/>
+            </a:pPr>
+            <a:r>
+              <a:rPr lang="en-US" sz="2800" i="1" dirty="0">
+                <a:solidFill>
+                  <a:srgbClr val="00FF00"/>
+                </a:solidFill>
+              </a:rPr>
+              <a:t>Before Reaction</a:t>
+            </a:r>
+          </a:p>
+          <a:p>
+            <a:pPr marL="457200" indent="-457200">
+              <a:buFont typeface="+mj-lt"/>
+              <a:buAutoNum type="arabicPeriod"/>
+            </a:pPr>
+            <a:r>
+              <a:rPr lang="en-US" dirty="0"/>
+              <a:t>Determine mass of empty </a:t>
+            </a:r>
+            <a:r>
+              <a:rPr lang="en-US" dirty="0">
+                <a:solidFill>
+                  <a:schemeClr val="accent1">
+                    <a:lumMod val="60000"/>
+                    <a:lumOff val="40000"/>
+                  </a:schemeClr>
+                </a:solidFill>
+              </a:rPr>
+              <a:t>crucible</a:t>
+            </a:r>
+            <a:r>
+              <a:rPr lang="en-US" dirty="0"/>
+              <a:t> </a:t>
+            </a:r>
+            <a:r>
+              <a:rPr lang="en-US" b="1" dirty="0">
+                <a:solidFill>
+                  <a:srgbClr val="FF9933"/>
+                </a:solidFill>
+              </a:rPr>
+              <a:t>AND NOT THE LID! </a:t>
+            </a:r>
+            <a:r>
+              <a:rPr lang="en-US" b="1" dirty="0">
+                <a:sym typeface="Wingdings" panose="05000000000000000000" pitchFamily="2" charset="2"/>
+              </a:rPr>
+              <a:t> </a:t>
+            </a:r>
+            <a:r>
+              <a:rPr lang="en-US" b="1" dirty="0"/>
+              <a:t>All digits of the balance</a:t>
+            </a:r>
+            <a:endParaRPr lang="en-US" b="1" dirty="0">
+              <a:solidFill>
+                <a:srgbClr val="FF9933"/>
+              </a:solidFill>
+            </a:endParaRPr>
+          </a:p>
+          <a:p>
+            <a:pPr marL="457200" indent="-457200">
+              <a:buFont typeface="+mj-lt"/>
+              <a:buAutoNum type="arabicPeriod"/>
+            </a:pPr>
+            <a:r>
+              <a:rPr lang="en-US" dirty="0"/>
+              <a:t>On glassine paper, use a scoopula to obtain</a:t>
+            </a:r>
+            <a:br>
+              <a:rPr lang="en-US" dirty="0"/>
+            </a:br>
+            <a:r>
+              <a:rPr lang="en-US" b="1" dirty="0">
+                <a:solidFill>
+                  <a:schemeClr val="accent1">
+                    <a:lumMod val="60000"/>
+                    <a:lumOff val="40000"/>
+                  </a:schemeClr>
+                </a:solidFill>
+              </a:rPr>
+              <a:t>0.10</a:t>
+            </a:r>
+            <a:r>
+              <a:rPr lang="en-US" dirty="0"/>
+              <a:t> to </a:t>
+            </a:r>
+            <a:r>
+              <a:rPr lang="en-US" b="1" dirty="0">
+                <a:solidFill>
+                  <a:schemeClr val="accent1">
+                    <a:lumMod val="60000"/>
+                    <a:lumOff val="40000"/>
+                  </a:schemeClr>
+                </a:solidFill>
+              </a:rPr>
+              <a:t>0.15</a:t>
+            </a:r>
+            <a:r>
+              <a:rPr lang="en-US" dirty="0"/>
+              <a:t> </a:t>
+            </a:r>
+            <a:r>
+              <a:rPr lang="en-US" b="1" dirty="0">
+                <a:solidFill>
+                  <a:schemeClr val="accent1">
+                    <a:lumMod val="60000"/>
+                    <a:lumOff val="40000"/>
+                  </a:schemeClr>
+                </a:solidFill>
+              </a:rPr>
+              <a:t>g</a:t>
+            </a:r>
+            <a:r>
+              <a:rPr lang="en-US" dirty="0"/>
+              <a:t> </a:t>
+            </a:r>
+            <a:r>
+              <a:rPr lang="en-US" dirty="0">
+                <a:solidFill>
+                  <a:srgbClr val="FFFF00"/>
+                </a:solidFill>
+              </a:rPr>
+              <a:t>Mg turnings </a:t>
+            </a:r>
+            <a:r>
+              <a:rPr lang="en-US" dirty="0"/>
+              <a:t>and transfer to crucible</a:t>
+            </a:r>
+            <a:endParaRPr lang="en-US" dirty="0">
+              <a:solidFill>
+                <a:srgbClr val="FFFF00"/>
+              </a:solidFill>
+            </a:endParaRPr>
+          </a:p>
+          <a:p>
+            <a:pPr marL="457200" indent="-457200">
+              <a:buFont typeface="+mj-lt"/>
+              <a:buAutoNum type="arabicPeriod"/>
+            </a:pPr>
+            <a:r>
+              <a:rPr lang="en-US" dirty="0"/>
+              <a:t>Record mass of Mg on tared balance (NO LID)</a:t>
+            </a:r>
+          </a:p>
+          <a:p>
+            <a:pPr marL="457200" indent="-457200">
+              <a:buFont typeface="+mj-lt"/>
+              <a:buAutoNum type="arabicPeriod"/>
+            </a:pPr>
+            <a:r>
+              <a:rPr lang="en-US" dirty="0"/>
+              <a:t>In the fume hood as for previous experiment, set up the stand with iron right, clay triangle, Bunsen burner with gas hose connected</a:t>
+            </a:r>
+          </a:p>
+          <a:p>
+            <a:pPr marL="457200" indent="-457200">
+              <a:buFont typeface="+mj-lt"/>
+              <a:buAutoNum type="arabicPeriod"/>
+            </a:pPr>
+            <a:r>
+              <a:rPr lang="en-US" dirty="0"/>
+              <a:t>Strike the gas to a flame &amp; adjust the burner</a:t>
+            </a:r>
+          </a:p>
+          <a:p>
+            <a:pPr marL="457200" indent="-457200">
+              <a:buFont typeface="+mj-lt"/>
+              <a:buAutoNum type="arabicPeriod"/>
+            </a:pPr>
+            <a:r>
+              <a:rPr lang="en-US" dirty="0"/>
+              <a:t>Have the wire mesh ready to set the crucible on it for cooling</a:t>
+            </a:r>
+          </a:p>
+        </p:txBody>
+      </p:sp>
+    </p:spTree>
+    <p:extLst>
+      <p:ext uri="{BB962C8B-B14F-4D97-AF65-F5344CB8AC3E}">
+        <p14:creationId xmlns:p14="http://schemas.microsoft.com/office/powerpoint/2010/main" val="3789276793"/>
+      </p:ext>
+    </p:extLst>
+  </p:cSld>
+  <p:clrMapOvr>
+    <a:masterClrMapping/>
+  </p:clrMapOvr>
+</p:sld>
+</file>
+
+<file path=ppt/slides/slide11.xml><?xml version="1.0" encoding="utf-8"?>
+<p:sld xmlns:a="http://schemas.openxmlformats.org/drawingml/2006/main" xmlns:r="http://schemas.openxmlformats.org/officeDocument/2006/relationships" xmlns:p="http://schemas.openxmlformats.org/presentationml/2006/main">
+  <p:cSld>
+    <p:spTree>
+      <p:nvGrpSpPr>
+        <p:cNvPr id="1" name="">
+          <a:extLst>
+            <a:ext uri="{FF2B5EF4-FFF2-40B4-BE49-F238E27FC236}">
               <a16:creationId xmlns:a16="http://schemas.microsoft.com/office/drawing/2014/main" id="{80032430-C568-9444-018A-4A293518DCCA}"/>
             </a:ext>
           </a:extLst>
@@ -10580,50 +10858,16 @@
               <a:buAutoNum type="arabicPeriod"/>
             </a:pPr>
             <a:r>
-              <a:rPr lang="en-US" sz="2200" dirty="0"/>
-              <a:t>Heat the contents with a </a:t>
-            </a:r>
-            <a:r>
-              <a:rPr lang="en-US" sz="2200" dirty="0">
-                <a:solidFill>
-                  <a:schemeClr val="accent1">
-                    <a:lumMod val="60000"/>
-                    <a:lumOff val="40000"/>
-                  </a:schemeClr>
-                </a:solidFill>
-              </a:rPr>
-              <a:t>blue flame </a:t>
-            </a:r>
-            <a:r>
-              <a:rPr lang="en-US" sz="2200" dirty="0"/>
-              <a:t>of the </a:t>
-            </a:r>
-            <a:r>
-              <a:rPr lang="en-US" sz="2200" dirty="0">
-                <a:solidFill>
-                  <a:schemeClr val="accent1">
-                    <a:lumMod val="60000"/>
-                    <a:lumOff val="40000"/>
-                  </a:schemeClr>
-                </a:solidFill>
-              </a:rPr>
-              <a:t>Bunsen burner</a:t>
-            </a:r>
-            <a:r>
-              <a:rPr lang="en-US" sz="2200" dirty="0"/>
-              <a:t>. The </a:t>
-            </a:r>
-            <a:r>
-              <a:rPr lang="en-US" sz="2200" dirty="0">
+              <a:rPr lang="en-US" dirty="0"/>
+              <a:t>Place lid on crucible </a:t>
+            </a:r>
+            <a:r>
+              <a:rPr lang="en-US" b="1" dirty="0">
                 <a:solidFill>
                   <a:srgbClr val="FFFF00"/>
                 </a:solidFill>
               </a:rPr>
-              <a:t>sulfur</a:t>
-            </a:r>
-            <a:r>
-              <a:rPr lang="en-US" sz="2200" dirty="0"/>
-              <a:t> will melt within about a minute.</a:t>
+              <a:t>slightly ajar</a:t>
             </a:r>
           </a:p>
           <a:p>
@@ -10632,53 +10876,8 @@
               <a:buAutoNum type="arabicPeriod"/>
             </a:pPr>
             <a:r>
-              <a:rPr lang="en-US" sz="2200" dirty="0"/>
-              <a:t>Use the </a:t>
-            </a:r>
-            <a:r>
-              <a:rPr lang="en-US" sz="2200" dirty="0">
-                <a:solidFill>
-                  <a:schemeClr val="accent1">
-                    <a:lumMod val="60000"/>
-                    <a:lumOff val="40000"/>
-                  </a:schemeClr>
-                </a:solidFill>
-              </a:rPr>
-              <a:t>crucible tongs </a:t>
-            </a:r>
-            <a:r>
-              <a:rPr lang="en-US" sz="2200" dirty="0"/>
-              <a:t>to transfer the crucible to the </a:t>
-            </a:r>
-            <a:r>
-              <a:rPr lang="en-US" sz="2200" dirty="0">
-                <a:solidFill>
-                  <a:schemeClr val="accent1">
-                    <a:lumMod val="60000"/>
-                    <a:lumOff val="40000"/>
-                  </a:schemeClr>
-                </a:solidFill>
-              </a:rPr>
-              <a:t>wire mesh. </a:t>
-            </a:r>
-            <a:r>
-              <a:rPr lang="en-US" sz="2200" dirty="0"/>
-              <a:t>The</a:t>
-            </a:r>
-            <a:r>
-              <a:rPr lang="en-US" sz="2200" dirty="0">
-                <a:solidFill>
-                  <a:schemeClr val="accent1">
-                    <a:lumMod val="60000"/>
-                    <a:lumOff val="40000"/>
-                  </a:schemeClr>
-                </a:solidFill>
-              </a:rPr>
-              <a:t> </a:t>
-            </a:r>
-            <a:r>
-              <a:rPr lang="en-US" sz="2200" dirty="0"/>
-              <a:t>melted sulfur reacts with the copper during this time.</a:t>
+              <a:rPr lang="en-US" dirty="0"/>
+              <a:t>Carefully hold or set the Bunsen burner to burn the magnesium. Do this for about 5 minutes</a:t>
             </a:r>
           </a:p>
           <a:p>
@@ -10687,16 +10886,8 @@
               <a:buAutoNum type="arabicPeriod"/>
             </a:pPr>
             <a:r>
-              <a:rPr lang="en-US" sz="2200" dirty="0"/>
-              <a:t>Put the crucible back on the flame: the unreacted sulfur will burn off, forming sulfur dioxide (SO</a:t>
-            </a:r>
-            <a:r>
-              <a:rPr lang="en-US" sz="2200" baseline="-25000" dirty="0"/>
-              <a:t>2</a:t>
-            </a:r>
-            <a:r>
-              <a:rPr lang="en-US" sz="2200" dirty="0"/>
-              <a:t>) gas, vented in the hood. The crucible looks clean and dry except for the coil of copper sulfide.</a:t>
+              <a:rPr lang="en-US" dirty="0"/>
+              <a:t>Take the lid off, which lets more air (oxygen) in</a:t>
             </a:r>
           </a:p>
           <a:p>
@@ -10705,8 +10896,8 @@
               <a:buAutoNum type="arabicPeriod"/>
             </a:pPr>
             <a:r>
-              <a:rPr lang="en-US" sz="2200" dirty="0"/>
-              <a:t>Set the crucible again on the wire mesh to cool</a:t>
+              <a:rPr lang="en-US" dirty="0"/>
+              <a:t>Continue to heat for another 15 min, but be prepared to put lid back on ajar temporarily if more “flaring” occurs</a:t>
             </a:r>
           </a:p>
           <a:p>
@@ -10715,16 +10906,8 @@
               <a:buAutoNum type="arabicPeriod"/>
             </a:pPr>
             <a:r>
-              <a:rPr lang="en-US" sz="2200" dirty="0"/>
-              <a:t>Record mass of crucible with the new compound (</a:t>
-            </a:r>
-            <a:r>
-              <a:rPr lang="en-US" sz="2200" b="1" dirty="0"/>
-              <a:t>D</a:t>
-            </a:r>
-            <a:r>
-              <a:rPr lang="en-US" sz="2200" dirty="0"/>
-              <a:t>)</a:t>
+              <a:rPr lang="en-US" dirty="0"/>
+              <a:t>Let crucible cool on wire mesh about 5 minutes</a:t>
             </a:r>
           </a:p>
           <a:p>
@@ -10734,7 +10917,11 @@
             </a:pPr>
             <a:r>
               <a:rPr lang="en-US" sz="2200" dirty="0"/>
-              <a:t>Carefully tip crucible contents on to watch glass and make observations of physical properties</a:t>
+              <a:t>MAKING SURE crucible has cooled, record mass of the reaction on balance </a:t>
+            </a:r>
+            <a:r>
+              <a:rPr lang="en-US" dirty="0"/>
+              <a:t>(Post-reaction reading #1)</a:t>
             </a:r>
           </a:p>
           <a:p>
@@ -10742,7 +10929,10 @@
               <a:buFont typeface="+mj-lt"/>
               <a:buAutoNum type="arabicPeriod"/>
             </a:pPr>
-            <a:endParaRPr lang="en-US" dirty="0"/>
+            <a:r>
+              <a:rPr lang="en-US" dirty="0"/>
+              <a:t>Reheat crucible (NO LID) for 10 min more and let cool. Record mass (Post-reaction reading #2)</a:t>
+            </a:r>
           </a:p>
           <a:p>
             <a:pPr marL="457200" indent="-457200">
@@ -10766,7 +10956,7 @@
 </p:sld>
 </file>
 
-<file path=ppt/slides/slide11.xml><?xml version="1.0" encoding="utf-8"?>
+<file path=ppt/slides/slide12.xml><?xml version="1.0" encoding="utf-8"?>
 <p:sld xmlns:a="http://schemas.openxmlformats.org/drawingml/2006/main" xmlns:r="http://schemas.openxmlformats.org/officeDocument/2006/relationships" xmlns:p="http://schemas.openxmlformats.org/presentationml/2006/main">
   <p:cSld>
     <p:spTree>
@@ -10774,7 +10964,7 @@
         <p:cNvPr id="1" name="">
           <a:extLst>
             <a:ext uri="{FF2B5EF4-FFF2-40B4-BE49-F238E27FC236}">
-              <a16:creationId xmlns:a16="http://schemas.microsoft.com/office/drawing/2014/main" id="{BA86FC53-DF32-CE64-DFB5-7C8645A52D75}"/>
+              <a16:creationId xmlns:a16="http://schemas.microsoft.com/office/drawing/2014/main" id="{DE083C94-C17D-CD23-D51C-DB6481B67AEA}"/>
             </a:ext>
           </a:extLst>
         </p:cNvPr>
@@ -10794,7 +10984,7 @@
           <p:cNvPr id="2" name="Title 1">
             <a:extLst>
               <a:ext uri="{FF2B5EF4-FFF2-40B4-BE49-F238E27FC236}">
-                <a16:creationId xmlns:a16="http://schemas.microsoft.com/office/drawing/2014/main" id="{C16FF693-5E30-D813-D298-9AB46F923D33}"/>
+                <a16:creationId xmlns:a16="http://schemas.microsoft.com/office/drawing/2014/main" id="{F641ED07-F2F6-06C7-E52F-D44D3D4FAE95}"/>
               </a:ext>
             </a:extLst>
           </p:cNvPr>
@@ -10817,7 +11007,7 @@
           <a:p>
             <a:r>
               <a:rPr lang="en-US" sz="4400" dirty="0"/>
-              <a:t>Example Data Analysis</a:t>
+              <a:t>Procedure</a:t>
             </a:r>
           </a:p>
         </p:txBody>
@@ -10827,7 +11017,7 @@
           <p:cNvPr id="6" name="Content Placeholder 5">
             <a:extLst>
               <a:ext uri="{FF2B5EF4-FFF2-40B4-BE49-F238E27FC236}">
-                <a16:creationId xmlns:a16="http://schemas.microsoft.com/office/drawing/2014/main" id="{584FB2EA-A75D-4ADA-B03B-899868167CF9}"/>
+                <a16:creationId xmlns:a16="http://schemas.microsoft.com/office/drawing/2014/main" id="{2F80F9EF-0A83-034E-1470-04DE50094CB2}"/>
               </a:ext>
             </a:extLst>
           </p:cNvPr>
@@ -10848,707 +11038,51 @@
           <a:bodyPr/>
           <a:lstStyle/>
           <a:p>
-            <a:pPr marL="457200" indent="-457200">
-              <a:buFont typeface="+mj-lt"/>
-              <a:buAutoNum type="arabicPeriod"/>
-            </a:pPr>
-            <a:r>
-              <a:rPr lang="en-US" dirty="0"/>
-              <a:t>Suppose A=23.7584 g, B=34.3532 g,</a:t>
-            </a:r>
-            <a:br>
-              <a:rPr lang="en-US" dirty="0"/>
-            </a:br>
-            <a:r>
-              <a:rPr lang="en-US" dirty="0"/>
-              <a:t>C=37.5732 g. After the reaction, D=36.7841 g</a:t>
-            </a:r>
-          </a:p>
-          <a:p>
-            <a:pPr marL="457200" indent="-457200">
-              <a:buFont typeface="+mj-lt"/>
-              <a:buAutoNum type="arabicPeriod"/>
-            </a:pPr>
-            <a:r>
-              <a:rPr lang="en-US" dirty="0"/>
-              <a:t>[B-A]=10.5948 g, [C-B]=3.2200 g,</a:t>
-            </a:r>
-            <a:br>
-              <a:rPr lang="en-US" dirty="0"/>
-            </a:br>
-            <a:r>
-              <a:rPr lang="en-US" dirty="0"/>
-              <a:t>[D-A]=13.0257 g</a:t>
-            </a:r>
-          </a:p>
-          <a:p>
-            <a:pPr marL="457200" indent="-457200">
-              <a:buFont typeface="+mj-lt"/>
-              <a:buAutoNum type="arabicPeriod"/>
-            </a:pPr>
-            <a:r>
-              <a:rPr lang="en-US" dirty="0"/>
-              <a:t>Copper reacted should be same as initial copper, because copper doesn’t go anywhere</a:t>
-            </a:r>
-          </a:p>
-          <a:p>
-            <a:pPr marL="457200" indent="-457200">
-              <a:buFont typeface="+mj-lt"/>
-              <a:buAutoNum type="arabicPeriod"/>
-            </a:pPr>
-            <a:r>
-              <a:rPr lang="en-US" dirty="0"/>
-              <a:t>Sulfur reacted should be [D-A]-[B-A]=13.0257 g - 10.5948 g= 2.4309 g</a:t>
-            </a:r>
-          </a:p>
-          <a:p>
-            <a:pPr marL="457200" indent="-457200">
-              <a:buFont typeface="+mj-lt"/>
-              <a:buAutoNum type="arabicPeriod"/>
-            </a:pPr>
-            <a:r>
-              <a:rPr lang="en-US" dirty="0"/>
-              <a:t>Excess sulfur = [C-B]-2.4309 g = 3.2200 g – 2.4309 g =0.7891 g </a:t>
-            </a:r>
-          </a:p>
-          <a:p>
-            <a:pPr marL="457200" indent="-457200">
-              <a:buFont typeface="+mj-lt"/>
-              <a:buAutoNum type="arabicPeriod"/>
-            </a:pPr>
-            <a:endParaRPr lang="en-US" dirty="0"/>
-          </a:p>
-          <a:p>
             <a:pPr marL="0" indent="0">
               <a:buNone/>
             </a:pPr>
             <a:r>
+              <a:rPr lang="en-US" sz="2800" i="1" dirty="0">
+                <a:solidFill>
+                  <a:srgbClr val="00FF00"/>
+                </a:solidFill>
+              </a:rPr>
+              <a:t>Post-Reaction</a:t>
+            </a:r>
+          </a:p>
+          <a:p>
+            <a:pPr marL="457200" indent="-457200">
+              <a:buFont typeface="+mj-lt"/>
+              <a:buAutoNum type="arabicPeriod" startAt="8"/>
+            </a:pPr>
+            <a:r>
               <a:rPr lang="en-US" dirty="0"/>
-              <a:t>Mass ratio </a:t>
-            </a:r>
+              <a:t>If the difference between Reading #1 and #2 are within ±0.001 g, proceed with the results. Use the GREATER value of the two mass readings</a:t>
+            </a:r>
+          </a:p>
+          <a:p>
+            <a:pPr marL="457200" indent="-457200">
+              <a:buFont typeface="+mj-lt"/>
+              <a:buAutoNum type="arabicPeriod" startAt="8"/>
+            </a:pPr>
             <a:r>
               <a:rPr lang="en-US" sz="2000" dirty="0"/>
-              <a:t>= </a:t>
-            </a:r>
-            <a:r>
-              <a:rPr lang="en-US" sz="1800" dirty="0"/>
-              <a:t>c</a:t>
-            </a:r>
-            <a:r>
-              <a:rPr lang="en-US" sz="2000" dirty="0"/>
-              <a:t>opper/sulfur reacted =</a:t>
-            </a:r>
-            <a:r>
-              <a:rPr lang="en-US" dirty="0"/>
-              <a:t> 10.5948 g/2.4309 g</a:t>
-            </a:r>
-            <a:br>
-              <a:rPr lang="en-US" dirty="0"/>
-            </a:br>
-            <a:r>
-              <a:rPr lang="en-US" dirty="0"/>
-              <a:t>= 4.3583</a:t>
-            </a:r>
+              <a:t>If the two readings have differences larger than 0.001 g, repeat the heating step to get the difference down. Magnesium oxide is a white powder, but could be light gray because of impurities</a:t>
+            </a:r>
+          </a:p>
+          <a:p>
+            <a:pPr marL="457200" indent="-457200">
+              <a:buFont typeface="+mj-lt"/>
+              <a:buAutoNum type="arabicPeriod" startAt="8"/>
+            </a:pPr>
+            <a:endParaRPr lang="en-US" sz="2800" dirty="0"/>
           </a:p>
         </p:txBody>
       </p:sp>
     </p:spTree>
     <p:extLst>
       <p:ext uri="{BB962C8B-B14F-4D97-AF65-F5344CB8AC3E}">
-        <p14:creationId xmlns:p14="http://schemas.microsoft.com/office/powerpoint/2010/main" val="2049909912"/>
-      </p:ext>
-    </p:extLst>
-  </p:cSld>
-  <p:clrMapOvr>
-    <a:masterClrMapping/>
-  </p:clrMapOvr>
-</p:sld>
-</file>
-
-<file path=ppt/slides/slide12.xml><?xml version="1.0" encoding="utf-8"?>
-<p:sld xmlns:a="http://schemas.openxmlformats.org/drawingml/2006/main" xmlns:r="http://schemas.openxmlformats.org/officeDocument/2006/relationships" xmlns:p="http://schemas.openxmlformats.org/presentationml/2006/main">
-  <p:cSld>
-    <p:spTree>
-      <p:nvGrpSpPr>
-        <p:cNvPr id="1" name="">
-          <a:extLst>
-            <a:ext uri="{FF2B5EF4-FFF2-40B4-BE49-F238E27FC236}">
-              <a16:creationId xmlns:a16="http://schemas.microsoft.com/office/drawing/2014/main" id="{F9605A24-FE88-1B37-6F21-A6AE688FD93A}"/>
-            </a:ext>
-          </a:extLst>
-        </p:cNvPr>
-        <p:cNvGrpSpPr/>
-        <p:nvPr/>
-      </p:nvGrpSpPr>
-      <p:grpSpPr>
-        <a:xfrm>
-          <a:off x="0" y="0"/>
-          <a:ext cx="0" cy="0"/>
-          <a:chOff x="0" y="0"/>
-          <a:chExt cx="0" cy="0"/>
-        </a:xfrm>
-      </p:grpSpPr>
-      <p:sp>
-        <p:nvSpPr>
-          <p:cNvPr id="2" name="Title 1">
-            <a:extLst>
-              <a:ext uri="{FF2B5EF4-FFF2-40B4-BE49-F238E27FC236}">
-                <a16:creationId xmlns:a16="http://schemas.microsoft.com/office/drawing/2014/main" id="{1473B395-B63F-4CB7-0692-A64546C69508}"/>
-              </a:ext>
-            </a:extLst>
-          </p:cNvPr>
-          <p:cNvSpPr>
-            <a:spLocks noGrp="1"/>
-          </p:cNvSpPr>
-          <p:nvPr>
-            <p:ph type="title"/>
-          </p:nvPr>
-        </p:nvSpPr>
-        <p:spPr>
-          <a:xfrm>
-            <a:off x="338666" y="183025"/>
-            <a:ext cx="8421512" cy="769441"/>
-          </a:xfrm>
-        </p:spPr>
-        <p:txBody>
-          <a:bodyPr/>
-          <a:lstStyle/>
-          <a:p>
-            <a:r>
-              <a:rPr lang="en-US" sz="4400" dirty="0"/>
-              <a:t>Example Data Analysis</a:t>
-            </a:r>
-          </a:p>
-        </p:txBody>
-      </p:sp>
-      <mc:AlternateContent xmlns:mc="http://schemas.openxmlformats.org/markup-compatibility/2006" xmlns:a14="http://schemas.microsoft.com/office/drawing/2010/main">
-        <mc:Choice Requires="a14">
-          <p:sp>
-            <p:nvSpPr>
-              <p:cNvPr id="6" name="Content Placeholder 5">
-                <a:extLst>
-                  <a:ext uri="{FF2B5EF4-FFF2-40B4-BE49-F238E27FC236}">
-                    <a16:creationId xmlns:a16="http://schemas.microsoft.com/office/drawing/2014/main" id="{A7219B4E-9803-A35C-5535-085CE995377D}"/>
-                  </a:ext>
-                </a:extLst>
-              </p:cNvPr>
-              <p:cNvSpPr>
-                <a:spLocks noGrp="1"/>
-              </p:cNvSpPr>
-              <p:nvPr>
-                <p:ph idx="1"/>
-              </p:nvPr>
-            </p:nvSpPr>
-            <p:spPr>
-              <a:xfrm>
-                <a:off x="372533" y="952466"/>
-                <a:ext cx="8387645" cy="5595089"/>
-              </a:xfrm>
-            </p:spPr>
-            <p:txBody>
-              <a:bodyPr/>
-              <a:lstStyle/>
-              <a:p>
-                <a:pPr marL="0" indent="0">
-                  <a:buNone/>
-                </a:pPr>
-                <a:r>
-                  <a:rPr lang="en-US" dirty="0"/>
-                  <a:t>What does the mass ratio show?</a:t>
-                </a:r>
-              </a:p>
-              <a:p>
-                <a:pPr marL="0" indent="0">
-                  <a:buNone/>
-                </a:pPr>
-                <a:r>
-                  <a:rPr lang="en-US" dirty="0"/>
-                  <a:t>For every 1 g of S, there are about 4.4 g Cu</a:t>
-                </a:r>
-              </a:p>
-              <a:p>
-                <a:pPr marL="0" indent="0">
-                  <a:buNone/>
-                </a:pPr>
-                <a:endParaRPr lang="en-US" sz="1200" dirty="0"/>
-              </a:p>
-              <a:p>
-                <a:pPr marL="0" indent="0">
-                  <a:buNone/>
-                </a:pPr>
-                <a:r>
-                  <a:rPr lang="en-US" dirty="0"/>
-                  <a:t>Look at the molar masses of S and Cu.</a:t>
-                </a:r>
-              </a:p>
-              <a:p>
-                <a:pPr marL="0" indent="0">
-                  <a:buNone/>
-                </a:pPr>
-                <a:endParaRPr lang="en-US" sz="1200" dirty="0"/>
-              </a:p>
-              <a:p>
-                <a:pPr marL="0" indent="0">
-                  <a:buNone/>
-                </a:pPr>
-                <a:r>
-                  <a:rPr lang="en-US" dirty="0"/>
-                  <a:t>If there are 32.065 g/mol S and 63.546 g/mol Cu, and there are 2 mol Cu and 1 mol S in Cu</a:t>
-                </a:r>
-                <a:r>
-                  <a:rPr lang="en-US" baseline="-25000" dirty="0"/>
-                  <a:t>2</a:t>
-                </a:r>
-                <a:r>
-                  <a:rPr lang="en-US" dirty="0"/>
-                  <a:t>S, then what is the theoretical mass ratio of S to Cu in Cu</a:t>
-                </a:r>
-                <a:r>
-                  <a:rPr lang="en-US" baseline="-25000" dirty="0"/>
-                  <a:t>2</a:t>
-                </a:r>
-                <a:r>
-                  <a:rPr lang="en-US" dirty="0"/>
-                  <a:t>S?</a:t>
-                </a:r>
-              </a:p>
-              <a:p>
-                <a:pPr marL="0" indent="0">
-                  <a:buNone/>
-                </a:pPr>
-                <a:endParaRPr lang="en-US" dirty="0"/>
-              </a:p>
-              <a:p>
-                <a:pPr marL="0" indent="0">
-                  <a:buNone/>
-                </a:pPr>
-                <a14:m>
-                  <m:oMathPara xmlns:m="http://schemas.openxmlformats.org/officeDocument/2006/math">
-                    <m:oMathParaPr>
-                      <m:jc m:val="centerGroup"/>
-                    </m:oMathParaPr>
-                    <m:oMath xmlns:m="http://schemas.openxmlformats.org/officeDocument/2006/math">
-                      <m:f>
-                        <m:fPr>
-                          <m:ctrlPr>
-                            <a:rPr lang="en-US" i="1" smtClean="0">
-                              <a:latin typeface="Cambria Math" panose="02040503050406030204" pitchFamily="18" charset="0"/>
-                            </a:rPr>
-                          </m:ctrlPr>
-                        </m:fPr>
-                        <m:num>
-                          <m:f>
-                            <m:fPr>
-                              <m:ctrlPr>
-                                <a:rPr lang="en-US" i="1" smtClean="0">
-                                  <a:latin typeface="Cambria Math" panose="02040503050406030204" pitchFamily="18" charset="0"/>
-                                </a:rPr>
-                              </m:ctrlPr>
-                            </m:fPr>
-                            <m:num>
-                              <m:r>
-                                <m:rPr>
-                                  <m:nor/>
-                                </m:rPr>
-                                <a:rPr lang="en-US" b="0" i="0" smtClean="0">
-                                  <a:latin typeface="Cambria Math" panose="02040503050406030204" pitchFamily="18" charset="0"/>
-                                </a:rPr>
-                                <m:t>63.546 </m:t>
-                              </m:r>
-                              <m:r>
-                                <m:rPr>
-                                  <m:nor/>
-                                </m:rPr>
-                                <a:rPr lang="en-US" b="0" i="0" smtClean="0">
-                                  <a:latin typeface="Cambria Math" panose="02040503050406030204" pitchFamily="18" charset="0"/>
-                                </a:rPr>
-                                <m:t>g</m:t>
-                              </m:r>
-                              <m:r>
-                                <m:rPr>
-                                  <m:nor/>
-                                </m:rPr>
-                                <a:rPr lang="en-US" b="0" i="0" smtClean="0">
-                                  <a:latin typeface="Cambria Math" panose="02040503050406030204" pitchFamily="18" charset="0"/>
-                                </a:rPr>
-                                <m:t> </m:t>
-                              </m:r>
-                              <m:r>
-                                <m:rPr>
-                                  <m:nor/>
-                                </m:rPr>
-                                <a:rPr lang="en-US" b="0" i="0" smtClean="0">
-                                  <a:latin typeface="Cambria Math" panose="02040503050406030204" pitchFamily="18" charset="0"/>
-                                </a:rPr>
-                                <m:t>Cu</m:t>
-                              </m:r>
-                            </m:num>
-                            <m:den>
-                              <m:r>
-                                <m:rPr>
-                                  <m:nor/>
-                                </m:rPr>
-                                <a:rPr lang="en-US" b="0" i="0" smtClean="0">
-                                  <a:latin typeface="Cambria Math" panose="02040503050406030204" pitchFamily="18" charset="0"/>
-                                </a:rPr>
-                                <m:t>mol</m:t>
-                              </m:r>
-                              <m:r>
-                                <m:rPr>
-                                  <m:nor/>
-                                </m:rPr>
-                                <a:rPr lang="en-US" b="0" i="0" smtClean="0">
-                                  <a:latin typeface="Cambria Math" panose="02040503050406030204" pitchFamily="18" charset="0"/>
-                                </a:rPr>
-                                <m:t> </m:t>
-                              </m:r>
-                              <m:r>
-                                <m:rPr>
-                                  <m:nor/>
-                                </m:rPr>
-                                <a:rPr lang="en-US" b="0" i="0" smtClean="0">
-                                  <a:latin typeface="Cambria Math" panose="02040503050406030204" pitchFamily="18" charset="0"/>
-                                </a:rPr>
-                                <m:t>Cu</m:t>
-                              </m:r>
-                            </m:den>
-                          </m:f>
-                          <m:r>
-                            <m:rPr>
-                              <m:nor/>
-                            </m:rPr>
-                            <a:rPr lang="en-US" i="0" smtClean="0">
-                              <a:latin typeface="Cambria Math" panose="02040503050406030204" pitchFamily="18" charset="0"/>
-                              <a:ea typeface="Cambria Math" panose="02040503050406030204" pitchFamily="18" charset="0"/>
-                            </a:rPr>
-                            <m:t>×</m:t>
-                          </m:r>
-                          <m:r>
-                            <m:rPr>
-                              <m:nor/>
-                            </m:rPr>
-                            <a:rPr lang="en-US" b="0" i="0" smtClean="0">
-                              <a:latin typeface="Cambria Math" panose="02040503050406030204" pitchFamily="18" charset="0"/>
-                              <a:ea typeface="Cambria Math" panose="02040503050406030204" pitchFamily="18" charset="0"/>
-                            </a:rPr>
-                            <m:t>2 </m:t>
-                          </m:r>
-                          <m:r>
-                            <m:rPr>
-                              <m:nor/>
-                            </m:rPr>
-                            <a:rPr lang="en-US" b="0" i="0" smtClean="0">
-                              <a:latin typeface="Cambria Math" panose="02040503050406030204" pitchFamily="18" charset="0"/>
-                              <a:ea typeface="Cambria Math" panose="02040503050406030204" pitchFamily="18" charset="0"/>
-                            </a:rPr>
-                            <m:t>mol</m:t>
-                          </m:r>
-                          <m:r>
-                            <m:rPr>
-                              <m:nor/>
-                            </m:rPr>
-                            <a:rPr lang="en-US" b="0" i="0" smtClean="0">
-                              <a:latin typeface="Cambria Math" panose="02040503050406030204" pitchFamily="18" charset="0"/>
-                              <a:ea typeface="Cambria Math" panose="02040503050406030204" pitchFamily="18" charset="0"/>
-                            </a:rPr>
-                            <m:t> </m:t>
-                          </m:r>
-                          <m:r>
-                            <m:rPr>
-                              <m:nor/>
-                            </m:rPr>
-                            <a:rPr lang="en-US" b="0" i="0" smtClean="0">
-                              <a:latin typeface="Cambria Math" panose="02040503050406030204" pitchFamily="18" charset="0"/>
-                              <a:ea typeface="Cambria Math" panose="02040503050406030204" pitchFamily="18" charset="0"/>
-                            </a:rPr>
-                            <m:t>Cu</m:t>
-                          </m:r>
-                        </m:num>
-                        <m:den>
-                          <m:f>
-                            <m:fPr>
-                              <m:ctrlPr>
-                                <a:rPr lang="en-US" i="1" smtClean="0">
-                                  <a:latin typeface="Cambria Math" panose="02040503050406030204" pitchFamily="18" charset="0"/>
-                                </a:rPr>
-                              </m:ctrlPr>
-                            </m:fPr>
-                            <m:num>
-                              <m:r>
-                                <m:rPr>
-                                  <m:nor/>
-                                </m:rPr>
-                                <a:rPr lang="en-US" i="0">
-                                  <a:latin typeface="Cambria Math" panose="02040503050406030204" pitchFamily="18" charset="0"/>
-                                </a:rPr>
-                                <m:t>32.065 </m:t>
-                              </m:r>
-                              <m:r>
-                                <m:rPr>
-                                  <m:nor/>
-                                </m:rPr>
-                                <a:rPr lang="en-US" i="0">
-                                  <a:latin typeface="Cambria Math" panose="02040503050406030204" pitchFamily="18" charset="0"/>
-                                </a:rPr>
-                                <m:t>g</m:t>
-                              </m:r>
-                              <m:r>
-                                <m:rPr>
-                                  <m:nor/>
-                                </m:rPr>
-                                <a:rPr lang="en-US" i="0">
-                                  <a:latin typeface="Cambria Math" panose="02040503050406030204" pitchFamily="18" charset="0"/>
-                                </a:rPr>
-                                <m:t> </m:t>
-                              </m:r>
-                              <m:r>
-                                <m:rPr>
-                                  <m:nor/>
-                                </m:rPr>
-                                <a:rPr lang="en-US" i="0">
-                                  <a:latin typeface="Cambria Math" panose="02040503050406030204" pitchFamily="18" charset="0"/>
-                                </a:rPr>
-                                <m:t>S</m:t>
-                              </m:r>
-                            </m:num>
-                            <m:den>
-                              <m:r>
-                                <m:rPr>
-                                  <m:nor/>
-                                </m:rPr>
-                                <a:rPr lang="en-US" b="0" i="0" smtClean="0">
-                                  <a:latin typeface="Cambria Math" panose="02040503050406030204" pitchFamily="18" charset="0"/>
-                                </a:rPr>
-                                <m:t>mol</m:t>
-                              </m:r>
-                              <m:r>
-                                <m:rPr>
-                                  <m:nor/>
-                                </m:rPr>
-                                <a:rPr lang="en-US" b="0" i="0" smtClean="0">
-                                  <a:latin typeface="Cambria Math" panose="02040503050406030204" pitchFamily="18" charset="0"/>
-                                </a:rPr>
-                                <m:t> </m:t>
-                              </m:r>
-                              <m:r>
-                                <m:rPr>
-                                  <m:nor/>
-                                </m:rPr>
-                                <a:rPr lang="en-US" b="0" i="0" smtClean="0">
-                                  <a:latin typeface="Cambria Math" panose="02040503050406030204" pitchFamily="18" charset="0"/>
-                                </a:rPr>
-                                <m:t>S</m:t>
-                              </m:r>
-                            </m:den>
-                          </m:f>
-                          <m:r>
-                            <m:rPr>
-                              <m:nor/>
-                            </m:rPr>
-                            <a:rPr lang="en-US" i="0" smtClean="0">
-                              <a:latin typeface="Cambria Math" panose="02040503050406030204" pitchFamily="18" charset="0"/>
-                              <a:ea typeface="Cambria Math" panose="02040503050406030204" pitchFamily="18" charset="0"/>
-                            </a:rPr>
-                            <m:t>×</m:t>
-                          </m:r>
-                          <m:r>
-                            <m:rPr>
-                              <m:nor/>
-                            </m:rPr>
-                            <a:rPr lang="en-US" b="0" i="0" smtClean="0">
-                              <a:latin typeface="Cambria Math" panose="02040503050406030204" pitchFamily="18" charset="0"/>
-                              <a:ea typeface="Cambria Math" panose="02040503050406030204" pitchFamily="18" charset="0"/>
-                            </a:rPr>
-                            <m:t>1 </m:t>
-                          </m:r>
-                          <m:r>
-                            <m:rPr>
-                              <m:nor/>
-                            </m:rPr>
-                            <a:rPr lang="en-US" b="0" i="0" smtClean="0">
-                              <a:latin typeface="Cambria Math" panose="02040503050406030204" pitchFamily="18" charset="0"/>
-                              <a:ea typeface="Cambria Math" panose="02040503050406030204" pitchFamily="18" charset="0"/>
-                            </a:rPr>
-                            <m:t>mol</m:t>
-                          </m:r>
-                          <m:r>
-                            <m:rPr>
-                              <m:nor/>
-                            </m:rPr>
-                            <a:rPr lang="en-US" b="0" i="0" smtClean="0">
-                              <a:latin typeface="Cambria Math" panose="02040503050406030204" pitchFamily="18" charset="0"/>
-                              <a:ea typeface="Cambria Math" panose="02040503050406030204" pitchFamily="18" charset="0"/>
-                            </a:rPr>
-                            <m:t> </m:t>
-                          </m:r>
-                          <m:r>
-                            <m:rPr>
-                              <m:nor/>
-                            </m:rPr>
-                            <a:rPr lang="en-US" b="0" i="0" smtClean="0">
-                              <a:latin typeface="Cambria Math" panose="02040503050406030204" pitchFamily="18" charset="0"/>
-                              <a:ea typeface="Cambria Math" panose="02040503050406030204" pitchFamily="18" charset="0"/>
-                            </a:rPr>
-                            <m:t>S</m:t>
-                          </m:r>
-                        </m:den>
-                      </m:f>
-                      <m:r>
-                        <a:rPr lang="en-US" b="0" i="1" smtClean="0">
-                          <a:latin typeface="Cambria Math" panose="02040503050406030204" pitchFamily="18" charset="0"/>
-                        </a:rPr>
-                        <m:t>=</m:t>
-                      </m:r>
-                      <m:f>
-                        <m:fPr>
-                          <m:ctrlPr>
-                            <a:rPr lang="en-US" b="0" i="1" smtClean="0">
-                              <a:latin typeface="Cambria Math" panose="02040503050406030204" pitchFamily="18" charset="0"/>
-                            </a:rPr>
-                          </m:ctrlPr>
-                        </m:fPr>
-                        <m:num>
-                          <m:r>
-                            <m:rPr>
-                              <m:nor/>
-                            </m:rPr>
-                            <a:rPr lang="en-US" i="0">
-                              <a:latin typeface="Cambria Math" panose="02040503050406030204" pitchFamily="18" charset="0"/>
-                            </a:rPr>
-                            <m:t>3.9636 </m:t>
-                          </m:r>
-                          <m:r>
-                            <m:rPr>
-                              <m:nor/>
-                            </m:rPr>
-                            <a:rPr lang="en-US" i="0">
-                              <a:latin typeface="Cambria Math" panose="02040503050406030204" pitchFamily="18" charset="0"/>
-                            </a:rPr>
-                            <m:t>g</m:t>
-                          </m:r>
-                          <m:r>
-                            <m:rPr>
-                              <m:nor/>
-                            </m:rPr>
-                            <a:rPr lang="en-US" i="0">
-                              <a:latin typeface="Cambria Math" panose="02040503050406030204" pitchFamily="18" charset="0"/>
-                            </a:rPr>
-                            <m:t> </m:t>
-                          </m:r>
-                          <m:r>
-                            <m:rPr>
-                              <m:nor/>
-                            </m:rPr>
-                            <a:rPr lang="en-US" i="0">
-                              <a:latin typeface="Cambria Math" panose="02040503050406030204" pitchFamily="18" charset="0"/>
-                            </a:rPr>
-                            <m:t>Cu</m:t>
-                          </m:r>
-                        </m:num>
-                        <m:den>
-                          <m:r>
-                            <m:rPr>
-                              <m:nor/>
-                            </m:rPr>
-                            <a:rPr lang="en-US" b="0" i="0" smtClean="0">
-                              <a:latin typeface="Cambria Math" panose="02040503050406030204" pitchFamily="18" charset="0"/>
-                            </a:rPr>
-                            <m:t>1 </m:t>
-                          </m:r>
-                          <m:r>
-                            <m:rPr>
-                              <m:nor/>
-                            </m:rPr>
-                            <a:rPr lang="en-US" b="0" i="0" smtClean="0">
-                              <a:latin typeface="Cambria Math" panose="02040503050406030204" pitchFamily="18" charset="0"/>
-                            </a:rPr>
-                            <m:t>g</m:t>
-                          </m:r>
-                          <m:r>
-                            <m:rPr>
-                              <m:nor/>
-                            </m:rPr>
-                            <a:rPr lang="en-US" b="0" i="0" smtClean="0">
-                              <a:latin typeface="Cambria Math" panose="02040503050406030204" pitchFamily="18" charset="0"/>
-                            </a:rPr>
-                            <m:t> </m:t>
-                          </m:r>
-                          <m:r>
-                            <m:rPr>
-                              <m:nor/>
-                            </m:rPr>
-                            <a:rPr lang="en-US" b="0" i="0" smtClean="0">
-                              <a:latin typeface="Cambria Math" panose="02040503050406030204" pitchFamily="18" charset="0"/>
-                            </a:rPr>
-                            <m:t>S</m:t>
-                          </m:r>
-                        </m:den>
-                      </m:f>
-                    </m:oMath>
-                  </m:oMathPara>
-                </a14:m>
-                <a:endParaRPr lang="en-US" dirty="0"/>
-              </a:p>
-              <a:p>
-                <a:pPr marL="0" indent="0">
-                  <a:buNone/>
-                </a:pPr>
-                <a:r>
-                  <a:rPr lang="en-US" dirty="0"/>
-                  <a:t>4.4 g Cu/g S seems close to 4.0 g Cu/g S. How close can you get?</a:t>
-                </a:r>
-              </a:p>
-            </p:txBody>
-          </p:sp>
-        </mc:Choice>
-        <mc:Fallback xmlns="">
-          <p:sp>
-            <p:nvSpPr>
-              <p:cNvPr id="6" name="Content Placeholder 5">
-                <a:extLst>
-                  <a:ext uri="{FF2B5EF4-FFF2-40B4-BE49-F238E27FC236}">
-                    <a16:creationId xmlns:a16="http://schemas.microsoft.com/office/drawing/2014/main" id="{A7219B4E-9803-A35C-5535-085CE995377D}"/>
-                  </a:ext>
-                </a:extLst>
-              </p:cNvPr>
-              <p:cNvSpPr>
-                <a:spLocks noGrp="1" noRot="1" noChangeAspect="1" noMove="1" noResize="1" noEditPoints="1" noAdjustHandles="1" noChangeArrowheads="1" noChangeShapeType="1" noTextEdit="1"/>
-              </p:cNvSpPr>
-              <p:nvPr>
-                <p:ph idx="1"/>
-              </p:nvPr>
-            </p:nvSpPr>
-            <p:spPr>
-              <a:xfrm>
-                <a:off x="372533" y="952466"/>
-                <a:ext cx="8387645" cy="5595089"/>
-              </a:xfrm>
-              <a:blipFill>
-                <a:blip r:embed="rId2"/>
-                <a:stretch>
-                  <a:fillRect l="-1090" t="-871" r="-1817"/>
-                </a:stretch>
-              </a:blipFill>
-            </p:spPr>
-            <p:txBody>
-              <a:bodyPr/>
-              <a:lstStyle/>
-              <a:p>
-                <a:r>
-                  <a:rPr lang="en-US">
-                    <a:noFill/>
-                  </a:rPr>
-                  <a:t> </a:t>
-                </a:r>
-              </a:p>
-            </p:txBody>
-          </p:sp>
-        </mc:Fallback>
-      </mc:AlternateContent>
-    </p:spTree>
-    <p:extLst>
-      <p:ext uri="{BB962C8B-B14F-4D97-AF65-F5344CB8AC3E}">
-        <p14:creationId xmlns:p14="http://schemas.microsoft.com/office/powerpoint/2010/main" val="830215486"/>
+        <p14:creationId xmlns:p14="http://schemas.microsoft.com/office/powerpoint/2010/main" val="2931736301"/>
       </p:ext>
     </p:extLst>
   </p:cSld>
@@ -11626,25 +11160,13 @@
           <a:p>
             <a:r>
               <a:rPr lang="en-US" dirty="0"/>
-              <a:t>The copper sulfide product goes into solids waste container</a:t>
+              <a:t>The magnesium oxide product goes in the Solid Waste container</a:t>
             </a:r>
           </a:p>
           <a:p>
             <a:r>
               <a:rPr lang="en-US" dirty="0"/>
-              <a:t>WITHOUT AT ALL GETTING CRUCIBLE WET WITH ANY WATER, wipe crucible with dry paper towel</a:t>
-            </a:r>
-          </a:p>
-          <a:p>
-            <a:r>
-              <a:rPr lang="en-US" dirty="0"/>
-              <a:t>Use soapy water to clean the watch glass</a:t>
-            </a:r>
-          </a:p>
-          <a:p>
-            <a:r>
-              <a:rPr lang="en-US" dirty="0"/>
-              <a:t>Place all other items in appropriate locations</a:t>
+              <a:t>WITHOUT AT ALL GETTING CRUCIBLE WET WITH ANY WATER, wipe crucible with dry paper towel or use steel wool to clean</a:t>
             </a:r>
           </a:p>
         </p:txBody>
@@ -11653,6 +11175,681 @@
     <p:extLst>
       <p:ext uri="{BB962C8B-B14F-4D97-AF65-F5344CB8AC3E}">
         <p14:creationId xmlns:p14="http://schemas.microsoft.com/office/powerpoint/2010/main" val="3469914632"/>
+      </p:ext>
+    </p:extLst>
+  </p:cSld>
+  <p:clrMapOvr>
+    <a:masterClrMapping/>
+  </p:clrMapOvr>
+</p:sld>
+</file>
+
+<file path=ppt/slides/slide14.xml><?xml version="1.0" encoding="utf-8"?>
+<p:sld xmlns:a="http://schemas.openxmlformats.org/drawingml/2006/main" xmlns:r="http://schemas.openxmlformats.org/officeDocument/2006/relationships" xmlns:p="http://schemas.openxmlformats.org/presentationml/2006/main">
+  <p:cSld>
+    <p:spTree>
+      <p:nvGrpSpPr>
+        <p:cNvPr id="1" name="">
+          <a:extLst>
+            <a:ext uri="{FF2B5EF4-FFF2-40B4-BE49-F238E27FC236}">
+              <a16:creationId xmlns:a16="http://schemas.microsoft.com/office/drawing/2014/main" id="{A9FE053F-55EE-98BB-F6F0-23BD124A6A2E}"/>
+            </a:ext>
+          </a:extLst>
+        </p:cNvPr>
+        <p:cNvGrpSpPr/>
+        <p:nvPr/>
+      </p:nvGrpSpPr>
+      <p:grpSpPr>
+        <a:xfrm>
+          <a:off x="0" y="0"/>
+          <a:ext cx="0" cy="0"/>
+          <a:chOff x="0" y="0"/>
+          <a:chExt cx="0" cy="0"/>
+        </a:xfrm>
+      </p:grpSpPr>
+      <p:sp>
+        <p:nvSpPr>
+          <p:cNvPr id="2" name="Title 1">
+            <a:extLst>
+              <a:ext uri="{FF2B5EF4-FFF2-40B4-BE49-F238E27FC236}">
+                <a16:creationId xmlns:a16="http://schemas.microsoft.com/office/drawing/2014/main" id="{74CCE920-1ACB-0ABB-F5DD-8722E73A07D4}"/>
+              </a:ext>
+            </a:extLst>
+          </p:cNvPr>
+          <p:cNvSpPr>
+            <a:spLocks noGrp="1"/>
+          </p:cNvSpPr>
+          <p:nvPr>
+            <p:ph type="title"/>
+          </p:nvPr>
+        </p:nvSpPr>
+        <p:spPr>
+          <a:xfrm>
+            <a:off x="338666" y="183025"/>
+            <a:ext cx="8421512" cy="769441"/>
+          </a:xfrm>
+        </p:spPr>
+        <p:txBody>
+          <a:bodyPr/>
+          <a:lstStyle/>
+          <a:p>
+            <a:r>
+              <a:rPr lang="en-US" sz="4400" dirty="0"/>
+              <a:t>Data</a:t>
+            </a:r>
+          </a:p>
+        </p:txBody>
+      </p:sp>
+      <p:sp>
+        <p:nvSpPr>
+          <p:cNvPr id="6" name="Content Placeholder 5">
+            <a:extLst>
+              <a:ext uri="{FF2B5EF4-FFF2-40B4-BE49-F238E27FC236}">
+                <a16:creationId xmlns:a16="http://schemas.microsoft.com/office/drawing/2014/main" id="{0532B22C-47ED-F1EB-2CEE-BF9B01CA30C3}"/>
+              </a:ext>
+            </a:extLst>
+          </p:cNvPr>
+          <p:cNvSpPr>
+            <a:spLocks noGrp="1"/>
+          </p:cNvSpPr>
+          <p:nvPr>
+            <p:ph idx="1"/>
+          </p:nvPr>
+        </p:nvSpPr>
+        <p:spPr>
+          <a:xfrm>
+            <a:off x="372533" y="952466"/>
+            <a:ext cx="8387645" cy="5595089"/>
+          </a:xfrm>
+        </p:spPr>
+        <p:txBody>
+          <a:bodyPr/>
+          <a:lstStyle/>
+          <a:p>
+            <a:r>
+              <a:rPr lang="en-US" dirty="0"/>
+              <a:t>All mass readings in Data should be ALL the digits of the balance. All quantities should be numbers with units (g)</a:t>
+            </a:r>
+          </a:p>
+          <a:p>
+            <a:r>
+              <a:rPr lang="en-US" dirty="0"/>
+              <a:t>If your “2</a:t>
+            </a:r>
+            <a:r>
+              <a:rPr lang="en-US" baseline="30000" dirty="0"/>
+              <a:t>nd</a:t>
+            </a:r>
+            <a:r>
+              <a:rPr lang="en-US" dirty="0"/>
+              <a:t> weighing”</a:t>
+            </a:r>
+            <a:br>
+              <a:rPr lang="en-US" dirty="0"/>
+            </a:br>
+            <a:r>
+              <a:rPr lang="en-US" dirty="0"/>
+              <a:t>required reheating to get a</a:t>
+            </a:r>
+            <a:br>
+              <a:rPr lang="en-US" dirty="0"/>
+            </a:br>
+            <a:r>
+              <a:rPr lang="en-US" dirty="0"/>
+              <a:t>“3</a:t>
+            </a:r>
+            <a:r>
+              <a:rPr lang="en-US" baseline="30000" dirty="0"/>
+              <a:t>rd</a:t>
+            </a:r>
+            <a:r>
+              <a:rPr lang="en-US" dirty="0"/>
+              <a:t> weighing” and even more</a:t>
+            </a:r>
+            <a:br>
+              <a:rPr lang="en-US" dirty="0"/>
+            </a:br>
+            <a:r>
+              <a:rPr lang="en-US" dirty="0"/>
+              <a:t>then you should have a </a:t>
+            </a:r>
+            <a:br>
+              <a:rPr lang="en-US" dirty="0"/>
+            </a:br>
+            <a:r>
+              <a:rPr lang="en-US" dirty="0"/>
+              <a:t>“first weighing” and</a:t>
+            </a:r>
+            <a:br>
+              <a:rPr lang="en-US" dirty="0"/>
+            </a:br>
+            <a:r>
+              <a:rPr lang="en-US" dirty="0"/>
+              <a:t>“last weighing”</a:t>
+            </a:r>
+          </a:p>
+          <a:p>
+            <a:endParaRPr lang="en-US" sz="2800" dirty="0"/>
+          </a:p>
+        </p:txBody>
+      </p:sp>
+      <p:pic>
+        <p:nvPicPr>
+          <p:cNvPr id="4" name="Picture 3">
+            <a:extLst>
+              <a:ext uri="{FF2B5EF4-FFF2-40B4-BE49-F238E27FC236}">
+                <a16:creationId xmlns:a16="http://schemas.microsoft.com/office/drawing/2014/main" id="{00374BCB-DD22-0109-D88D-58C4CF70D607}"/>
+              </a:ext>
+            </a:extLst>
+          </p:cNvPr>
+          <p:cNvPicPr>
+            <a:picLocks noChangeAspect="1"/>
+          </p:cNvPicPr>
+          <p:nvPr/>
+        </p:nvPicPr>
+        <p:blipFill>
+          <a:blip r:embed="rId2"/>
+          <a:stretch>
+            <a:fillRect/>
+          </a:stretch>
+        </p:blipFill>
+        <p:spPr>
+          <a:xfrm>
+            <a:off x="5526241" y="2540833"/>
+            <a:ext cx="3466341" cy="4006722"/>
+          </a:xfrm>
+          <a:prstGeom prst="rect">
+            <a:avLst/>
+          </a:prstGeom>
+        </p:spPr>
+      </p:pic>
+    </p:spTree>
+    <p:extLst>
+      <p:ext uri="{BB962C8B-B14F-4D97-AF65-F5344CB8AC3E}">
+        <p14:creationId xmlns:p14="http://schemas.microsoft.com/office/powerpoint/2010/main" val="1244601867"/>
+      </p:ext>
+    </p:extLst>
+  </p:cSld>
+  <p:clrMapOvr>
+    <a:masterClrMapping/>
+  </p:clrMapOvr>
+</p:sld>
+</file>
+
+<file path=ppt/slides/slide15.xml><?xml version="1.0" encoding="utf-8"?>
+<p:sld xmlns:a="http://schemas.openxmlformats.org/drawingml/2006/main" xmlns:r="http://schemas.openxmlformats.org/officeDocument/2006/relationships" xmlns:p="http://schemas.openxmlformats.org/presentationml/2006/main">
+  <p:cSld>
+    <p:spTree>
+      <p:nvGrpSpPr>
+        <p:cNvPr id="1" name="">
+          <a:extLst>
+            <a:ext uri="{FF2B5EF4-FFF2-40B4-BE49-F238E27FC236}">
+              <a16:creationId xmlns:a16="http://schemas.microsoft.com/office/drawing/2014/main" id="{14B79CC3-4843-6CAB-B657-D3A449E9EB58}"/>
+            </a:ext>
+          </a:extLst>
+        </p:cNvPr>
+        <p:cNvGrpSpPr/>
+        <p:nvPr/>
+      </p:nvGrpSpPr>
+      <p:grpSpPr>
+        <a:xfrm>
+          <a:off x="0" y="0"/>
+          <a:ext cx="0" cy="0"/>
+          <a:chOff x="0" y="0"/>
+          <a:chExt cx="0" cy="0"/>
+        </a:xfrm>
+      </p:grpSpPr>
+      <p:sp>
+        <p:nvSpPr>
+          <p:cNvPr id="2" name="Title 1">
+            <a:extLst>
+              <a:ext uri="{FF2B5EF4-FFF2-40B4-BE49-F238E27FC236}">
+                <a16:creationId xmlns:a16="http://schemas.microsoft.com/office/drawing/2014/main" id="{C0549881-BF84-A838-244A-C9A5FB800190}"/>
+              </a:ext>
+            </a:extLst>
+          </p:cNvPr>
+          <p:cNvSpPr>
+            <a:spLocks noGrp="1"/>
+          </p:cNvSpPr>
+          <p:nvPr>
+            <p:ph type="title"/>
+          </p:nvPr>
+        </p:nvSpPr>
+        <p:spPr>
+          <a:xfrm>
+            <a:off x="338666" y="183025"/>
+            <a:ext cx="8421512" cy="769441"/>
+          </a:xfrm>
+        </p:spPr>
+        <p:txBody>
+          <a:bodyPr/>
+          <a:lstStyle/>
+          <a:p>
+            <a:r>
+              <a:rPr lang="en-US" sz="4400" dirty="0"/>
+              <a:t>My Open Math Form</a:t>
+            </a:r>
+          </a:p>
+        </p:txBody>
+      </p:sp>
+      <p:sp>
+        <p:nvSpPr>
+          <p:cNvPr id="6" name="Content Placeholder 5">
+            <a:extLst>
+              <a:ext uri="{FF2B5EF4-FFF2-40B4-BE49-F238E27FC236}">
+                <a16:creationId xmlns:a16="http://schemas.microsoft.com/office/drawing/2014/main" id="{3A280E5C-EEA7-E43E-019A-F46B07C4D00D}"/>
+              </a:ext>
+            </a:extLst>
+          </p:cNvPr>
+          <p:cNvSpPr>
+            <a:spLocks noGrp="1"/>
+          </p:cNvSpPr>
+          <p:nvPr>
+            <p:ph idx="1"/>
+          </p:nvPr>
+        </p:nvSpPr>
+        <p:spPr>
+          <a:xfrm>
+            <a:off x="372533" y="952466"/>
+            <a:ext cx="8387645" cy="5595089"/>
+          </a:xfrm>
+        </p:spPr>
+        <p:txBody>
+          <a:bodyPr/>
+          <a:lstStyle/>
+          <a:p>
+            <a:r>
+              <a:rPr lang="en-US" dirty="0"/>
+              <a:t>The Canvas app contains an Assignment (check Modules too) for Experiment 5a</a:t>
+            </a:r>
+          </a:p>
+          <a:p>
+            <a:r>
+              <a:rPr lang="en-US" dirty="0"/>
+              <a:t>This contains a form you can use to assist</a:t>
+            </a:r>
+            <a:br>
+              <a:rPr lang="en-US" dirty="0"/>
+            </a:br>
+            <a:r>
+              <a:rPr lang="en-US" dirty="0"/>
+              <a:t>in your data analysis</a:t>
+            </a:r>
+          </a:p>
+          <a:p>
+            <a:pPr marL="231775" lvl="1" indent="0">
+              <a:buNone/>
+            </a:pPr>
+            <a:r>
+              <a:rPr lang="en-US" dirty="0"/>
+              <a:t>The form should not be connected to the Gradebook</a:t>
+            </a:r>
+          </a:p>
+          <a:p>
+            <a:pPr marL="338137" indent="-342900"/>
+            <a:r>
+              <a:rPr lang="en-US" dirty="0"/>
+              <a:t>The form will not be able to help you answer the thought questions (#5 and #6 on the online form, Post-Lab questions #2 and #3 in the printed Chem 3A Lab manual)</a:t>
+            </a:r>
+            <a:br>
+              <a:rPr lang="en-US" dirty="0"/>
+            </a:br>
+            <a:br>
+              <a:rPr lang="en-US" dirty="0"/>
+            </a:br>
+            <a:r>
+              <a:rPr lang="en-US" dirty="0"/>
+              <a:t>To answer those questions, consider what you have learned in lecture and reading the book</a:t>
+            </a:r>
+          </a:p>
+          <a:p>
+            <a:pPr marL="231775" lvl="1" indent="0">
+              <a:buNone/>
+            </a:pPr>
+            <a:endParaRPr lang="en-US" dirty="0"/>
+          </a:p>
+        </p:txBody>
+      </p:sp>
+    </p:spTree>
+    <p:extLst>
+      <p:ext uri="{BB962C8B-B14F-4D97-AF65-F5344CB8AC3E}">
+        <p14:creationId xmlns:p14="http://schemas.microsoft.com/office/powerpoint/2010/main" val="2204166391"/>
+      </p:ext>
+    </p:extLst>
+  </p:cSld>
+  <p:clrMapOvr>
+    <a:masterClrMapping/>
+  </p:clrMapOvr>
+</p:sld>
+</file>
+
+<file path=ppt/slides/slide16.xml><?xml version="1.0" encoding="utf-8"?>
+<p:sld xmlns:a="http://schemas.openxmlformats.org/drawingml/2006/main" xmlns:r="http://schemas.openxmlformats.org/officeDocument/2006/relationships" xmlns:p="http://schemas.openxmlformats.org/presentationml/2006/main">
+  <p:cSld>
+    <p:spTree>
+      <p:nvGrpSpPr>
+        <p:cNvPr id="1" name="">
+          <a:extLst>
+            <a:ext uri="{FF2B5EF4-FFF2-40B4-BE49-F238E27FC236}">
+              <a16:creationId xmlns:a16="http://schemas.microsoft.com/office/drawing/2014/main" id="{8C2F4205-B483-D8AB-EBD2-19A103F49FBD}"/>
+            </a:ext>
+          </a:extLst>
+        </p:cNvPr>
+        <p:cNvGrpSpPr/>
+        <p:nvPr/>
+      </p:nvGrpSpPr>
+      <p:grpSpPr>
+        <a:xfrm>
+          <a:off x="0" y="0"/>
+          <a:ext cx="0" cy="0"/>
+          <a:chOff x="0" y="0"/>
+          <a:chExt cx="0" cy="0"/>
+        </a:xfrm>
+      </p:grpSpPr>
+      <p:sp>
+        <p:nvSpPr>
+          <p:cNvPr id="2" name="Title 1">
+            <a:extLst>
+              <a:ext uri="{FF2B5EF4-FFF2-40B4-BE49-F238E27FC236}">
+                <a16:creationId xmlns:a16="http://schemas.microsoft.com/office/drawing/2014/main" id="{B0CF2071-77D6-9D61-A045-8C4C374552A3}"/>
+              </a:ext>
+            </a:extLst>
+          </p:cNvPr>
+          <p:cNvSpPr>
+            <a:spLocks noGrp="1"/>
+          </p:cNvSpPr>
+          <p:nvPr>
+            <p:ph type="title"/>
+          </p:nvPr>
+        </p:nvSpPr>
+        <p:spPr>
+          <a:xfrm>
+            <a:off x="338666" y="183025"/>
+            <a:ext cx="8421512" cy="769441"/>
+          </a:xfrm>
+        </p:spPr>
+        <p:txBody>
+          <a:bodyPr/>
+          <a:lstStyle/>
+          <a:p>
+            <a:r>
+              <a:rPr lang="en-US" sz="4400" dirty="0"/>
+              <a:t>Results</a:t>
+            </a:r>
+          </a:p>
+        </p:txBody>
+      </p:sp>
+      <p:sp>
+        <p:nvSpPr>
+          <p:cNvPr id="6" name="Content Placeholder 5">
+            <a:extLst>
+              <a:ext uri="{FF2B5EF4-FFF2-40B4-BE49-F238E27FC236}">
+                <a16:creationId xmlns:a16="http://schemas.microsoft.com/office/drawing/2014/main" id="{0362DDD6-E250-ED51-F50B-0D11C285E066}"/>
+              </a:ext>
+            </a:extLst>
+          </p:cNvPr>
+          <p:cNvSpPr>
+            <a:spLocks noGrp="1"/>
+          </p:cNvSpPr>
+          <p:nvPr>
+            <p:ph idx="1"/>
+          </p:nvPr>
+        </p:nvSpPr>
+        <p:spPr>
+          <a:xfrm>
+            <a:off x="372533" y="952466"/>
+            <a:ext cx="8387645" cy="5595089"/>
+          </a:xfrm>
+        </p:spPr>
+        <p:txBody>
+          <a:bodyPr/>
+          <a:lstStyle/>
+          <a:p>
+            <a:r>
+              <a:rPr lang="en-US" dirty="0"/>
+              <a:t>All calculations should show number values with proper significant digits (for multiplication/division operations) and decimal places (for addition/subtraction operations)</a:t>
+            </a:r>
+          </a:p>
+          <a:p>
+            <a:r>
+              <a:rPr lang="en-US" dirty="0"/>
+              <a:t>Remember to use the GREATEST / HIGHEST value of any multiple mass readings you took in the post-reaction material</a:t>
+            </a:r>
+          </a:p>
+        </p:txBody>
+      </p:sp>
+    </p:spTree>
+    <p:extLst>
+      <p:ext uri="{BB962C8B-B14F-4D97-AF65-F5344CB8AC3E}">
+        <p14:creationId xmlns:p14="http://schemas.microsoft.com/office/powerpoint/2010/main" val="2091874716"/>
+      </p:ext>
+    </p:extLst>
+  </p:cSld>
+  <p:clrMapOvr>
+    <a:masterClrMapping/>
+  </p:clrMapOvr>
+</p:sld>
+</file>
+
+<file path=ppt/slides/slide17.xml><?xml version="1.0" encoding="utf-8"?>
+<p:sld xmlns:a="http://schemas.openxmlformats.org/drawingml/2006/main" xmlns:r="http://schemas.openxmlformats.org/officeDocument/2006/relationships" xmlns:p="http://schemas.openxmlformats.org/presentationml/2006/main">
+  <p:cSld>
+    <p:spTree>
+      <p:nvGrpSpPr>
+        <p:cNvPr id="1" name="">
+          <a:extLst>
+            <a:ext uri="{FF2B5EF4-FFF2-40B4-BE49-F238E27FC236}">
+              <a16:creationId xmlns:a16="http://schemas.microsoft.com/office/drawing/2014/main" id="{C32B4A0A-2AC5-CE03-A78D-3EDB79DC4873}"/>
+            </a:ext>
+          </a:extLst>
+        </p:cNvPr>
+        <p:cNvGrpSpPr/>
+        <p:nvPr/>
+      </p:nvGrpSpPr>
+      <p:grpSpPr>
+        <a:xfrm>
+          <a:off x="0" y="0"/>
+          <a:ext cx="0" cy="0"/>
+          <a:chOff x="0" y="0"/>
+          <a:chExt cx="0" cy="0"/>
+        </a:xfrm>
+      </p:grpSpPr>
+      <p:pic>
+        <p:nvPicPr>
+          <p:cNvPr id="8" name="Picture 7">
+            <a:extLst>
+              <a:ext uri="{FF2B5EF4-FFF2-40B4-BE49-F238E27FC236}">
+                <a16:creationId xmlns:a16="http://schemas.microsoft.com/office/drawing/2014/main" id="{31693555-573F-4A6A-48D4-44D226801804}"/>
+              </a:ext>
+            </a:extLst>
+          </p:cNvPr>
+          <p:cNvPicPr>
+            <a:picLocks noChangeAspect="1"/>
+          </p:cNvPicPr>
+          <p:nvPr/>
+        </p:nvPicPr>
+        <p:blipFill>
+          <a:blip r:embed="rId2"/>
+          <a:stretch>
+            <a:fillRect/>
+          </a:stretch>
+        </p:blipFill>
+        <p:spPr>
+          <a:xfrm>
+            <a:off x="1145200" y="170930"/>
+            <a:ext cx="5651839" cy="6542249"/>
+          </a:xfrm>
+          <a:prstGeom prst="rect">
+            <a:avLst/>
+          </a:prstGeom>
+        </p:spPr>
+      </p:pic>
+    </p:spTree>
+    <p:extLst>
+      <p:ext uri="{BB962C8B-B14F-4D97-AF65-F5344CB8AC3E}">
+        <p14:creationId xmlns:p14="http://schemas.microsoft.com/office/powerpoint/2010/main" val="3618285624"/>
+      </p:ext>
+    </p:extLst>
+  </p:cSld>
+  <p:clrMapOvr>
+    <a:masterClrMapping/>
+  </p:clrMapOvr>
+</p:sld>
+</file>
+
+<file path=ppt/slides/slide18.xml><?xml version="1.0" encoding="utf-8"?>
+<p:sld xmlns:a="http://schemas.openxmlformats.org/drawingml/2006/main" xmlns:r="http://schemas.openxmlformats.org/officeDocument/2006/relationships" xmlns:p="http://schemas.openxmlformats.org/presentationml/2006/main">
+  <p:cSld>
+    <p:spTree>
+      <p:nvGrpSpPr>
+        <p:cNvPr id="1" name="">
+          <a:extLst>
+            <a:ext uri="{FF2B5EF4-FFF2-40B4-BE49-F238E27FC236}">
+              <a16:creationId xmlns:a16="http://schemas.microsoft.com/office/drawing/2014/main" id="{D40B5AE7-021B-953A-12DC-E02B6B6E6D90}"/>
+            </a:ext>
+          </a:extLst>
+        </p:cNvPr>
+        <p:cNvGrpSpPr/>
+        <p:nvPr/>
+      </p:nvGrpSpPr>
+      <p:grpSpPr>
+        <a:xfrm>
+          <a:off x="0" y="0"/>
+          <a:ext cx="0" cy="0"/>
+          <a:chOff x="0" y="0"/>
+          <a:chExt cx="0" cy="0"/>
+        </a:xfrm>
+      </p:grpSpPr>
+      <p:pic>
+        <p:nvPicPr>
+          <p:cNvPr id="3" name="Picture 2">
+            <a:extLst>
+              <a:ext uri="{FF2B5EF4-FFF2-40B4-BE49-F238E27FC236}">
+                <a16:creationId xmlns:a16="http://schemas.microsoft.com/office/drawing/2014/main" id="{F08E3177-DF36-8CF3-B369-2E2AAB94E53C}"/>
+              </a:ext>
+            </a:extLst>
+          </p:cNvPr>
+          <p:cNvPicPr>
+            <a:picLocks noChangeAspect="1"/>
+          </p:cNvPicPr>
+          <p:nvPr/>
+        </p:nvPicPr>
+        <p:blipFill>
+          <a:blip r:embed="rId2"/>
+          <a:stretch>
+            <a:fillRect/>
+          </a:stretch>
+        </p:blipFill>
+        <p:spPr>
+          <a:xfrm>
+            <a:off x="2314575" y="0"/>
+            <a:ext cx="4514850" cy="6858000"/>
+          </a:xfrm>
+          <a:prstGeom prst="rect">
+            <a:avLst/>
+          </a:prstGeom>
+        </p:spPr>
+      </p:pic>
+    </p:spTree>
+    <p:extLst>
+      <p:ext uri="{BB962C8B-B14F-4D97-AF65-F5344CB8AC3E}">
+        <p14:creationId xmlns:p14="http://schemas.microsoft.com/office/powerpoint/2010/main" val="2894170254"/>
+      </p:ext>
+    </p:extLst>
+  </p:cSld>
+  <p:clrMapOvr>
+    <a:masterClrMapping/>
+  </p:clrMapOvr>
+</p:sld>
+</file>
+
+<file path=ppt/slides/slide19.xml><?xml version="1.0" encoding="utf-8"?>
+<p:sld xmlns:a="http://schemas.openxmlformats.org/drawingml/2006/main" xmlns:r="http://schemas.openxmlformats.org/officeDocument/2006/relationships" xmlns:p="http://schemas.openxmlformats.org/presentationml/2006/main">
+  <p:cSld>
+    <p:spTree>
+      <p:nvGrpSpPr>
+        <p:cNvPr id="1" name="">
+          <a:extLst>
+            <a:ext uri="{FF2B5EF4-FFF2-40B4-BE49-F238E27FC236}">
+              <a16:creationId xmlns:a16="http://schemas.microsoft.com/office/drawing/2014/main" id="{DEC7FB0B-5084-270A-9012-F979A0C1B682}"/>
+            </a:ext>
+          </a:extLst>
+        </p:cNvPr>
+        <p:cNvGrpSpPr/>
+        <p:nvPr/>
+      </p:nvGrpSpPr>
+      <p:grpSpPr>
+        <a:xfrm>
+          <a:off x="0" y="0"/>
+          <a:ext cx="0" cy="0"/>
+          <a:chOff x="0" y="0"/>
+          <a:chExt cx="0" cy="0"/>
+        </a:xfrm>
+      </p:grpSpPr>
+      <p:pic>
+        <p:nvPicPr>
+          <p:cNvPr id="12" name="Picture 11">
+            <a:extLst>
+              <a:ext uri="{FF2B5EF4-FFF2-40B4-BE49-F238E27FC236}">
+                <a16:creationId xmlns:a16="http://schemas.microsoft.com/office/drawing/2014/main" id="{D7FA81ED-BF63-8EDD-4E85-CF226BF22C1C}"/>
+              </a:ext>
+            </a:extLst>
+          </p:cNvPr>
+          <p:cNvPicPr>
+            <a:picLocks noChangeAspect="1"/>
+          </p:cNvPicPr>
+          <p:nvPr/>
+        </p:nvPicPr>
+        <p:blipFill>
+          <a:blip r:embed="rId2"/>
+          <a:stretch>
+            <a:fillRect/>
+          </a:stretch>
+        </p:blipFill>
+        <p:spPr>
+          <a:xfrm>
+            <a:off x="4572000" y="739105"/>
+            <a:ext cx="4474564" cy="5119100"/>
+          </a:xfrm>
+          <a:prstGeom prst="rect">
+            <a:avLst/>
+          </a:prstGeom>
+        </p:spPr>
+      </p:pic>
+      <p:pic>
+        <p:nvPicPr>
+          <p:cNvPr id="14" name="Picture 13">
+            <a:extLst>
+              <a:ext uri="{FF2B5EF4-FFF2-40B4-BE49-F238E27FC236}">
+                <a16:creationId xmlns:a16="http://schemas.microsoft.com/office/drawing/2014/main" id="{3B4D01A8-35BC-8276-E625-5D436BF45D57}"/>
+              </a:ext>
+            </a:extLst>
+          </p:cNvPr>
+          <p:cNvPicPr>
+            <a:picLocks noChangeAspect="1"/>
+          </p:cNvPicPr>
+          <p:nvPr/>
+        </p:nvPicPr>
+        <p:blipFill>
+          <a:blip r:embed="rId3"/>
+          <a:stretch>
+            <a:fillRect/>
+          </a:stretch>
+        </p:blipFill>
+        <p:spPr>
+          <a:xfrm>
+            <a:off x="194150" y="1311564"/>
+            <a:ext cx="4241369" cy="2683315"/>
+          </a:xfrm>
+          <a:prstGeom prst="rect">
+            <a:avLst/>
+          </a:prstGeom>
+        </p:spPr>
+      </p:pic>
+    </p:spTree>
+    <p:extLst>
+      <p:ext uri="{BB962C8B-B14F-4D97-AF65-F5344CB8AC3E}">
+        <p14:creationId xmlns:p14="http://schemas.microsoft.com/office/powerpoint/2010/main" val="4196733308"/>
       </p:ext>
     </p:extLst>
   </p:cSld>
@@ -11743,52 +11940,82 @@
             </a:pPr>
             <a:r>
               <a:rPr lang="en-US" dirty="0"/>
-              <a:t>Observe</a:t>
-            </a:r>
-          </a:p>
-          <a:p>
-            <a:r>
-              <a:rPr lang="en-US" dirty="0"/>
-              <a:t>physical properties of PURE elements: copper wire and solid sulfur</a:t>
-            </a:r>
-          </a:p>
-          <a:p>
-            <a:pPr marL="236538" lvl="1" indent="0">
+              <a:t>Observe reaction of solid magnesium with atmospheric oxygen to produce magnesium oxide</a:t>
+            </a:r>
+          </a:p>
+          <a:p>
+            <a:pPr marL="0" indent="0" algn="ctr">
               <a:buNone/>
             </a:pPr>
             <a:r>
-              <a:rPr lang="en-US" sz="2400" i="1" dirty="0">
-                <a:solidFill>
-                  <a:srgbClr val="CC99FF"/>
-                </a:solidFill>
-                <a:latin typeface="Times New Roman" panose="02020603050405020304" pitchFamily="18" charset="0"/>
-                <a:cs typeface="Times New Roman" panose="02020603050405020304" pitchFamily="18" charset="0"/>
+              <a:rPr lang="en-US" dirty="0"/>
+              <a:t>Mg (s) + O</a:t>
+            </a:r>
+            <a:r>
+              <a:rPr lang="en-US" baseline="-25000" dirty="0"/>
+              <a:t>2</a:t>
+            </a:r>
+            <a:r>
+              <a:rPr lang="en-US" dirty="0"/>
+              <a:t> (g) </a:t>
+            </a:r>
+            <a:r>
+              <a:rPr lang="en-US" dirty="0">
+                <a:sym typeface="Wingdings" panose="05000000000000000000" pitchFamily="2" charset="2"/>
               </a:rPr>
-              <a:t>What are the symbols? What is the proposed chemical reaction?</a:t>
-            </a:r>
-          </a:p>
-          <a:p>
-            <a:pPr marL="342900" indent="-342900"/>
-            <a:r>
-              <a:rPr lang="en-US" dirty="0"/>
-              <a:t>physical properties of compound formed from a chemical reaction of these elements</a:t>
-            </a:r>
-            <a:endParaRPr lang="en-US" sz="2000" i="1" dirty="0">
-              <a:solidFill>
-                <a:srgbClr val="CC99FF"/>
-              </a:solidFill>
-              <a:latin typeface="Times New Roman" panose="02020603050405020304" pitchFamily="18" charset="0"/>
-              <a:cs typeface="Times New Roman" panose="02020603050405020304" pitchFamily="18" charset="0"/>
-            </a:endParaRPr>
+              <a:t> </a:t>
+            </a:r>
+            <a:r>
+              <a:rPr lang="en-US" dirty="0" err="1">
+                <a:sym typeface="Wingdings" panose="05000000000000000000" pitchFamily="2" charset="2"/>
+              </a:rPr>
+              <a:t>Mg</a:t>
+            </a:r>
+            <a:r>
+              <a:rPr lang="en-US" baseline="-25000" dirty="0" err="1">
+                <a:sym typeface="Wingdings" panose="05000000000000000000" pitchFamily="2" charset="2"/>
+              </a:rPr>
+              <a:t>x</a:t>
+            </a:r>
+            <a:r>
+              <a:rPr lang="en-US" dirty="0" err="1">
+                <a:sym typeface="Wingdings" panose="05000000000000000000" pitchFamily="2" charset="2"/>
+              </a:rPr>
+              <a:t>O</a:t>
+            </a:r>
+            <a:r>
+              <a:rPr lang="en-US" baseline="-25000" dirty="0" err="1">
+                <a:sym typeface="Wingdings" panose="05000000000000000000" pitchFamily="2" charset="2"/>
+              </a:rPr>
+              <a:t>y</a:t>
+            </a:r>
+            <a:r>
+              <a:rPr lang="en-US" dirty="0">
+                <a:sym typeface="Wingdings" panose="05000000000000000000" pitchFamily="2" charset="2"/>
+              </a:rPr>
+              <a:t> (s)</a:t>
+            </a:r>
+          </a:p>
+          <a:p>
+            <a:pPr marL="0" indent="0">
+              <a:buNone/>
+            </a:pPr>
+            <a:r>
+              <a:rPr lang="en-US" sz="2000" dirty="0">
+                <a:sym typeface="Wingdings" panose="05000000000000000000" pitchFamily="2" charset="2"/>
+              </a:rPr>
+              <a:t>Note the chemical reaction (equation) is not balanced</a:t>
+            </a:r>
+            <a:endParaRPr lang="en-US" sz="2000" dirty="0"/>
           </a:p>
         </p:txBody>
       </p:sp>
       <p:pic>
         <p:nvPicPr>
-          <p:cNvPr id="7" name="Picture 6">
+          <p:cNvPr id="8" name="Picture 7">
             <a:extLst>
               <a:ext uri="{FF2B5EF4-FFF2-40B4-BE49-F238E27FC236}">
-                <a16:creationId xmlns:a16="http://schemas.microsoft.com/office/drawing/2014/main" id="{F8DB96C6-A975-B61F-73F4-8AC25ECD277E}"/>
+                <a16:creationId xmlns:a16="http://schemas.microsoft.com/office/drawing/2014/main" id="{D79FB390-91F4-867B-22A7-021A3DDC3159}"/>
               </a:ext>
             </a:extLst>
           </p:cNvPr>
@@ -11805,8 +12032,8 @@
         </p:blipFill>
         <p:spPr>
           <a:xfrm>
-            <a:off x="169331" y="3605417"/>
-            <a:ext cx="8794045" cy="3119903"/>
+            <a:off x="1484026" y="3795665"/>
+            <a:ext cx="5836770" cy="2768059"/>
           </a:xfrm>
           <a:prstGeom prst="rect">
             <a:avLst/>
@@ -11898,28 +12125,227 @@
           <a:bodyPr/>
           <a:lstStyle/>
           <a:p>
-            <a:pPr marL="0" indent="0">
-              <a:buNone/>
-            </a:pPr>
             <a:r>
               <a:rPr lang="en-US" sz="2000" dirty="0"/>
-              <a:t>Joseph Proust (1797) stated any sample of a particular compound would be made of same elements in same proportion by mass. This is the Law of Constant Composition.</a:t>
-            </a:r>
-          </a:p>
-          <a:p>
-            <a:pPr marL="0" indent="0">
-              <a:buNone/>
-            </a:pPr>
+              <a:t>The atom is the physical form of the element. Atoms of one type/identity will exist in very specific ratios with atoms of other elements to form compounds.</a:t>
+            </a:r>
+          </a:p>
+          <a:p>
+            <a:r>
+              <a:rPr lang="en-US" sz="2000" dirty="0"/>
+              <a:t>Compounds are generally of two types: </a:t>
+            </a:r>
+            <a:r>
+              <a:rPr lang="en-US" sz="2000" dirty="0">
+                <a:solidFill>
+                  <a:schemeClr val="accent1">
+                    <a:lumMod val="60000"/>
+                    <a:lumOff val="40000"/>
+                  </a:schemeClr>
+                </a:solidFill>
+              </a:rPr>
+              <a:t>ionic</a:t>
+            </a:r>
+            <a:r>
+              <a:rPr lang="en-US" sz="2000" dirty="0"/>
+              <a:t> or </a:t>
+            </a:r>
+            <a:r>
+              <a:rPr lang="en-US" sz="2000" dirty="0">
+                <a:solidFill>
+                  <a:schemeClr val="accent1">
+                    <a:lumMod val="60000"/>
+                    <a:lumOff val="40000"/>
+                  </a:schemeClr>
+                </a:solidFill>
+              </a:rPr>
+              <a:t>molecular</a:t>
+            </a:r>
             <a:endParaRPr lang="en-US" sz="2000" dirty="0"/>
           </a:p>
           <a:p>
-            <a:pPr marL="0" indent="0">
-              <a:buNone/>
-            </a:pPr>
-            <a:r>
-              <a:rPr lang="en-US" sz="2000" dirty="0"/>
-              <a:t>This principle is connected with the Law of the Conservation of Mass and also Dalton’s Atomic Theory concerning how the atoms of elements are never destroyed or created, but just rearranged in chemical reactions forming new compounds.</a:t>
-            </a:r>
+            <a:r>
+              <a:rPr lang="en-US" dirty="0">
+                <a:solidFill>
+                  <a:srgbClr val="00FF00"/>
+                </a:solidFill>
+              </a:rPr>
+              <a:t>Ionic compounds </a:t>
+            </a:r>
+            <a:r>
+              <a:rPr lang="en-US" dirty="0"/>
+              <a:t>in </a:t>
+            </a:r>
+            <a:r>
+              <a:rPr lang="en-US" dirty="0">
+                <a:solidFill>
+                  <a:schemeClr val="accent1">
+                    <a:lumMod val="60000"/>
+                    <a:lumOff val="40000"/>
+                  </a:schemeClr>
+                </a:solidFill>
+              </a:rPr>
+              <a:t>solid form </a:t>
+            </a:r>
+            <a:r>
+              <a:rPr lang="en-US" dirty="0"/>
+              <a:t>are characterized by a </a:t>
+            </a:r>
+            <a:r>
+              <a:rPr lang="en-US" dirty="0">
+                <a:solidFill>
+                  <a:srgbClr val="00FF00"/>
+                </a:solidFill>
+              </a:rPr>
+              <a:t>crystal lattice of ions </a:t>
+            </a:r>
+            <a:r>
+              <a:rPr lang="en-US" dirty="0"/>
+              <a:t>held by </a:t>
+            </a:r>
+            <a:r>
+              <a:rPr lang="en-US" dirty="0">
+                <a:solidFill>
+                  <a:schemeClr val="accent1">
+                    <a:lumMod val="60000"/>
+                    <a:lumOff val="40000"/>
+                  </a:schemeClr>
+                </a:solidFill>
+              </a:rPr>
+              <a:t>strong electrostatic forces</a:t>
+            </a:r>
+            <a:r>
+              <a:rPr lang="en-US" dirty="0"/>
+              <a:t>, resulting in </a:t>
+            </a:r>
+            <a:r>
+              <a:rPr lang="en-US" dirty="0">
+                <a:solidFill>
+                  <a:srgbClr val="FFFF00"/>
+                </a:solidFill>
+              </a:rPr>
+              <a:t>hardness</a:t>
+            </a:r>
+            <a:r>
+              <a:rPr lang="en-US" dirty="0"/>
+              <a:t>, </a:t>
+            </a:r>
+            <a:r>
+              <a:rPr lang="en-US" dirty="0">
+                <a:solidFill>
+                  <a:srgbClr val="FFFF00"/>
+                </a:solidFill>
+              </a:rPr>
+              <a:t>high melting points</a:t>
+            </a:r>
+            <a:r>
+              <a:rPr lang="en-US" dirty="0"/>
+              <a:t>, and </a:t>
+            </a:r>
+            <a:r>
+              <a:rPr lang="en-US" dirty="0">
+                <a:solidFill>
+                  <a:srgbClr val="FFFF00"/>
+                </a:solidFill>
+              </a:rPr>
+              <a:t>brittleness</a:t>
+            </a:r>
+          </a:p>
+          <a:p>
+            <a:r>
+              <a:rPr lang="en-US" dirty="0">
+                <a:solidFill>
+                  <a:srgbClr val="00FF00"/>
+                </a:solidFill>
+              </a:rPr>
+              <a:t>Molecular compounds </a:t>
+            </a:r>
+            <a:r>
+              <a:rPr lang="en-US" dirty="0"/>
+              <a:t>in </a:t>
+            </a:r>
+            <a:r>
+              <a:rPr lang="en-US" dirty="0">
+                <a:solidFill>
+                  <a:schemeClr val="accent1">
+                    <a:lumMod val="60000"/>
+                    <a:lumOff val="40000"/>
+                  </a:schemeClr>
+                </a:solidFill>
+              </a:rPr>
+              <a:t>solid form </a:t>
+            </a:r>
+            <a:r>
+              <a:rPr lang="en-US" dirty="0"/>
+              <a:t>consist of </a:t>
+            </a:r>
+            <a:r>
+              <a:rPr lang="en-US" dirty="0">
+                <a:solidFill>
+                  <a:schemeClr val="accent1">
+                    <a:lumMod val="60000"/>
+                    <a:lumOff val="40000"/>
+                  </a:schemeClr>
+                </a:solidFill>
+              </a:rPr>
+              <a:t>discrete molecules</a:t>
+            </a:r>
+            <a:r>
+              <a:rPr lang="en-US" dirty="0"/>
+              <a:t> held by </a:t>
+            </a:r>
+            <a:r>
+              <a:rPr lang="en-US" dirty="0">
+                <a:solidFill>
+                  <a:schemeClr val="accent1">
+                    <a:lumMod val="60000"/>
+                    <a:lumOff val="40000"/>
+                  </a:schemeClr>
+                </a:solidFill>
+              </a:rPr>
+              <a:t>weaker intermolecular forces</a:t>
+            </a:r>
+            <a:r>
+              <a:rPr lang="en-US" dirty="0"/>
+              <a:t>, leading to </a:t>
+            </a:r>
+            <a:r>
+              <a:rPr lang="en-US" dirty="0">
+                <a:solidFill>
+                  <a:srgbClr val="FFFF00"/>
+                </a:solidFill>
+              </a:rPr>
+              <a:t>softer structures</a:t>
+            </a:r>
+            <a:r>
+              <a:rPr lang="en-US" dirty="0"/>
+              <a:t>, </a:t>
+            </a:r>
+            <a:r>
+              <a:rPr lang="en-US" dirty="0">
+                <a:solidFill>
+                  <a:srgbClr val="FFFF00"/>
+                </a:solidFill>
+              </a:rPr>
+              <a:t>lower melting points</a:t>
+            </a:r>
+            <a:r>
+              <a:rPr lang="en-US" dirty="0"/>
+              <a:t>, and </a:t>
+            </a:r>
+            <a:r>
+              <a:rPr lang="en-US" dirty="0">
+                <a:solidFill>
+                  <a:srgbClr val="FFFF00"/>
+                </a:solidFill>
+              </a:rPr>
+              <a:t>diverse physical states</a:t>
+            </a:r>
+            <a:endParaRPr lang="en-US" sz="2000" dirty="0">
+              <a:solidFill>
+                <a:srgbClr val="FFFF00"/>
+              </a:solidFill>
+            </a:endParaRPr>
           </a:p>
         </p:txBody>
       </p:sp>
@@ -11944,7 +12370,7 @@
         <p:cNvPr id="1" name="">
           <a:extLst>
             <a:ext uri="{FF2B5EF4-FFF2-40B4-BE49-F238E27FC236}">
-              <a16:creationId xmlns:a16="http://schemas.microsoft.com/office/drawing/2014/main" id="{3DAB1E55-1723-E0EE-7EFD-D02607EA16A9}"/>
+              <a16:creationId xmlns:a16="http://schemas.microsoft.com/office/drawing/2014/main" id="{B4C185EA-87F0-3B6D-99DD-396296AF475E}"/>
             </a:ext>
           </a:extLst>
         </p:cNvPr>
@@ -11964,7 +12390,7 @@
           <p:cNvPr id="2" name="Title 1">
             <a:extLst>
               <a:ext uri="{FF2B5EF4-FFF2-40B4-BE49-F238E27FC236}">
-                <a16:creationId xmlns:a16="http://schemas.microsoft.com/office/drawing/2014/main" id="{D903C2D8-8186-46AC-8E06-7D4D7AEDE47B}"/>
+                <a16:creationId xmlns:a16="http://schemas.microsoft.com/office/drawing/2014/main" id="{6F3CD681-A798-F167-1596-B2E4C7BAF746}"/>
               </a:ext>
             </a:extLst>
           </p:cNvPr>
@@ -11982,7 +12408,7 @@
           <a:p>
             <a:r>
               <a:rPr lang="en-US" dirty="0"/>
-              <a:t>Limiting &amp; Excess Reagents</a:t>
+              <a:t>Background</a:t>
             </a:r>
           </a:p>
         </p:txBody>
@@ -11992,7 +12418,7 @@
           <p:cNvPr id="3" name="Content Placeholder 2">
             <a:extLst>
               <a:ext uri="{FF2B5EF4-FFF2-40B4-BE49-F238E27FC236}">
-                <a16:creationId xmlns:a16="http://schemas.microsoft.com/office/drawing/2014/main" id="{CFC3C184-A6E1-15DB-1130-302523D67542}"/>
+                <a16:creationId xmlns:a16="http://schemas.microsoft.com/office/drawing/2014/main" id="{78AE4565-89C3-5464-3997-F83512000BF0}"/>
               </a:ext>
             </a:extLst>
           </p:cNvPr>
@@ -12009,16 +12435,27 @@
           <a:lstStyle/>
           <a:p>
             <a:r>
-              <a:rPr lang="en-US" dirty="0"/>
-              <a:t>You will learn a very useful concept in chemistry, which is that of the </a:t>
-            </a:r>
-            <a:r>
               <a:rPr lang="en-US" dirty="0">
                 <a:solidFill>
-                  <a:srgbClr val="00FF00"/>
+                  <a:schemeClr val="accent1">
+                    <a:lumMod val="60000"/>
+                    <a:lumOff val="40000"/>
+                  </a:schemeClr>
                 </a:solidFill>
               </a:rPr>
-              <a:t>limiting</a:t>
+              <a:t>Ionic compounds </a:t>
+            </a:r>
+            <a:r>
+              <a:rPr lang="en-US" dirty="0"/>
+              <a:t>that are crystal solids consist of a large network of </a:t>
+            </a:r>
+            <a:r>
+              <a:rPr lang="en-US" dirty="0">
+                <a:solidFill>
+                  <a:srgbClr val="FFFF00"/>
+                </a:solidFill>
+              </a:rPr>
+              <a:t>cations</a:t>
             </a:r>
             <a:r>
               <a:rPr lang="en-US" dirty="0"/>
@@ -12027,62 +12464,115 @@
             <a:r>
               <a:rPr lang="en-US" dirty="0">
                 <a:solidFill>
-                  <a:srgbClr val="00FF00"/>
+                  <a:srgbClr val="FFFF00"/>
                 </a:solidFill>
               </a:rPr>
-              <a:t>excess</a:t>
+              <a:t>anions</a:t>
             </a:r>
             <a:r>
               <a:rPr lang="en-US" dirty="0"/>
-              <a:t> </a:t>
+              <a:t> in a </a:t>
             </a:r>
             <a:r>
               <a:rPr lang="en-US" dirty="0">
                 <a:solidFill>
-                  <a:srgbClr val="00FF00"/>
+                  <a:srgbClr val="FFFF00"/>
                 </a:solidFill>
               </a:rPr>
-              <a:t>reagents</a:t>
+              <a:t>formula unit</a:t>
             </a:r>
             <a:r>
               <a:rPr lang="en-US" dirty="0"/>
-              <a:t>.</a:t>
-            </a:r>
-          </a:p>
-          <a:p>
-            <a:r>
-              <a:rPr lang="en-US" dirty="0"/>
-              <a:t>In this experiment, the copper solid mass will be the limiting reagent, and sulfur will be the excess reagent.</a:t>
-            </a:r>
-          </a:p>
-          <a:p>
-            <a:r>
-              <a:rPr lang="en-US" dirty="0"/>
-              <a:t>This means we want ALL the copper mass to completely react with an excess amount of sulfur</a:t>
-            </a:r>
-          </a:p>
-          <a:p>
-            <a:pPr marL="0" indent="0">
-              <a:buNone/>
-            </a:pPr>
-            <a:r>
-              <a:rPr lang="en-US" i="1" dirty="0">
+              <a:t>, with the ratio of elements being an </a:t>
+            </a:r>
+            <a:r>
+              <a:rPr lang="en-US" dirty="0">
                 <a:solidFill>
-                  <a:srgbClr val="FFC000"/>
+                  <a:schemeClr val="accent1">
+                    <a:lumMod val="60000"/>
+                    <a:lumOff val="40000"/>
+                  </a:schemeClr>
                 </a:solidFill>
               </a:rPr>
-              <a:t>So how do we know if all the copper will react?</a:t>
-            </a:r>
-          </a:p>
-          <a:p>
+              <a:t>empirical formula</a:t>
+            </a:r>
             <a:endParaRPr lang="en-US" dirty="0"/>
+          </a:p>
+          <a:p>
+            <a:r>
+              <a:rPr lang="en-US" dirty="0">
+                <a:solidFill>
+                  <a:schemeClr val="accent1">
+                    <a:lumMod val="60000"/>
+                    <a:lumOff val="40000"/>
+                  </a:schemeClr>
+                </a:solidFill>
+              </a:rPr>
+              <a:t>Molecular formula</a:t>
+            </a:r>
+            <a:r>
+              <a:rPr lang="en-US" dirty="0"/>
+              <a:t> of a </a:t>
+            </a:r>
+            <a:r>
+              <a:rPr lang="en-US" dirty="0">
+                <a:solidFill>
+                  <a:schemeClr val="accent1">
+                    <a:lumMod val="60000"/>
+                    <a:lumOff val="40000"/>
+                  </a:schemeClr>
+                </a:solidFill>
+              </a:rPr>
+              <a:t>molecular compound </a:t>
+            </a:r>
+            <a:r>
+              <a:rPr lang="en-US" dirty="0"/>
+              <a:t>will be a multiple of the </a:t>
+            </a:r>
+            <a:r>
+              <a:rPr lang="en-US" dirty="0">
+                <a:solidFill>
+                  <a:schemeClr val="accent1">
+                    <a:lumMod val="60000"/>
+                    <a:lumOff val="40000"/>
+                  </a:schemeClr>
+                </a:solidFill>
+              </a:rPr>
+              <a:t>empirical formula</a:t>
+            </a:r>
+          </a:p>
+          <a:p>
+            <a:r>
+              <a:rPr lang="en-US" dirty="0"/>
+              <a:t>For this experiment, the goal is to determine empirical formula of an oxide of magnesium (</a:t>
+            </a:r>
+            <a:r>
+              <a:rPr lang="en-US" dirty="0" err="1"/>
+              <a:t>Mg</a:t>
+            </a:r>
+            <a:r>
+              <a:rPr lang="en-US" baseline="-25000" dirty="0" err="1"/>
+              <a:t>x</a:t>
+            </a:r>
+            <a:r>
+              <a:rPr lang="en-US" dirty="0" err="1"/>
+              <a:t>O</a:t>
+            </a:r>
+            <a:r>
+              <a:rPr lang="en-US" baseline="-25000" dirty="0" err="1"/>
+              <a:t>y</a:t>
+            </a:r>
+            <a:r>
+              <a:rPr lang="en-US" dirty="0"/>
+              <a:t>)</a:t>
+            </a:r>
           </a:p>
         </p:txBody>
       </p:sp>
     </p:spTree>
     <p:extLst>
       <p:ext uri="{BB962C8B-B14F-4D97-AF65-F5344CB8AC3E}">
-        <p14:creationId xmlns:p14="http://schemas.microsoft.com/office/powerpoint/2010/main" val="3100576228"/>
+        <p14:creationId xmlns:p14="http://schemas.microsoft.com/office/powerpoint/2010/main" val="2920675742"/>
       </p:ext>
     </p:extLst>
   </p:cSld>
@@ -12138,7 +12628,7 @@
           <a:p>
             <a:r>
               <a:rPr lang="en-US" dirty="0"/>
-              <a:t>Experiment Planning</a:t>
+              <a:t>Experimental Variation/Error</a:t>
             </a:r>
           </a:p>
         </p:txBody>
@@ -12166,49 +12656,148 @@
           <a:p>
             <a:r>
               <a:rPr lang="en-US" dirty="0"/>
-              <a:t>Our lab manual says we should have from 2-4 g sulfur used in the reaction. Let’s assume we are at 2 g sulfur: what is the maximum amount of copper mass we should have for it to completely react with the sulfur we use?</a:t>
-            </a:r>
-          </a:p>
-          <a:p>
+              <a:t>With every experiment before the data is collected and the reaction done, it is useful to anticipate what might influence your results different from the ideal. For this experiment:</a:t>
+            </a:r>
+          </a:p>
+          <a:p>
+            <a:pPr marL="457200" indent="-457200">
+              <a:buFont typeface="+mj-lt"/>
+              <a:buAutoNum type="arabicPeriod"/>
+            </a:pPr>
             <a:r>
               <a:rPr lang="en-US" dirty="0"/>
-              <a:t>First we to see the chemical reaction that is happening</a:t>
-            </a:r>
-          </a:p>
-          <a:p>
-            <a:pPr marL="0" indent="0" algn="ctr">
+              <a:t>Incomplete combustion: perhaps only magnesium on surface of metal solid reacts with oxygen</a:t>
+            </a:r>
+          </a:p>
+          <a:p>
+            <a:pPr marL="236538" lvl="1" indent="0" algn="ctr">
               <a:buNone/>
             </a:pPr>
             <a:r>
               <a:rPr lang="en-US" dirty="0">
                 <a:solidFill>
-                  <a:schemeClr val="accent1">
-                    <a:lumMod val="60000"/>
-                    <a:lumOff val="40000"/>
-                  </a:schemeClr>
+                  <a:srgbClr val="FFC000"/>
                 </a:solidFill>
               </a:rPr>
-              <a:t>2 Cu (s) + S (s) </a:t>
+              <a:t>Break up ash to expose unreacted metal, reheat to avoid this</a:t>
+            </a:r>
+          </a:p>
+          <a:p>
+            <a:pPr marL="457200" indent="-457200">
+              <a:buFont typeface="+mj-lt"/>
+              <a:buAutoNum type="arabicPeriod"/>
+            </a:pPr>
+            <a:r>
+              <a:rPr lang="en-US" dirty="0"/>
+              <a:t>The atmosphere is 78% N</a:t>
+            </a:r>
+            <a:r>
+              <a:rPr lang="en-US" baseline="-25000" dirty="0"/>
+              <a:t>2</a:t>
+            </a:r>
+            <a:r>
+              <a:rPr lang="en-US" dirty="0"/>
+              <a:t> and 21% O</a:t>
+            </a:r>
+            <a:r>
+              <a:rPr lang="en-US" baseline="-25000" dirty="0"/>
+              <a:t>2</a:t>
+            </a:r>
+            <a:r>
+              <a:rPr lang="en-US" dirty="0"/>
+              <a:t>, and at very high temperatures (2000°C), some Mg can react with N</a:t>
+            </a:r>
+            <a:r>
+              <a:rPr lang="en-US" baseline="-25000" dirty="0"/>
+              <a:t>2: </a:t>
             </a:r>
             <a:r>
               <a:rPr lang="en-US" dirty="0">
                 <a:solidFill>
-                  <a:schemeClr val="accent1">
-                    <a:lumMod val="60000"/>
-                    <a:lumOff val="40000"/>
-                  </a:schemeClr>
+                  <a:srgbClr val="FFFF00"/>
+                </a:solidFill>
+              </a:rPr>
+              <a:t>3 Mg (</a:t>
+            </a:r>
+            <a:r>
+              <a:rPr lang="en-US" i="1" dirty="0">
+                <a:solidFill>
+                  <a:srgbClr val="FFFF00"/>
+                </a:solidFill>
+              </a:rPr>
+              <a:t>s</a:t>
+            </a:r>
+            <a:r>
+              <a:rPr lang="en-US" dirty="0">
+                <a:solidFill>
+                  <a:srgbClr val="FFFF00"/>
+                </a:solidFill>
+              </a:rPr>
+              <a:t>) + N</a:t>
+            </a:r>
+            <a:r>
+              <a:rPr lang="en-US" baseline="-25000" dirty="0">
+                <a:solidFill>
+                  <a:srgbClr val="FFFF00"/>
+                </a:solidFill>
+              </a:rPr>
+              <a:t>2</a:t>
+            </a:r>
+            <a:r>
+              <a:rPr lang="en-US" dirty="0">
+                <a:solidFill>
+                  <a:srgbClr val="FFFF00"/>
+                </a:solidFill>
+              </a:rPr>
+              <a:t> (</a:t>
+            </a:r>
+            <a:r>
+              <a:rPr lang="en-US" i="1" dirty="0">
+                <a:solidFill>
+                  <a:srgbClr val="FFFF00"/>
+                </a:solidFill>
+              </a:rPr>
+              <a:t>g</a:t>
+            </a:r>
+            <a:r>
+              <a:rPr lang="en-US" dirty="0">
+                <a:solidFill>
+                  <a:srgbClr val="FFFF00"/>
+                </a:solidFill>
+              </a:rPr>
+              <a:t>) </a:t>
+            </a:r>
+            <a:r>
+              <a:rPr lang="en-US" dirty="0">
+                <a:solidFill>
+                  <a:srgbClr val="FFFF00"/>
                 </a:solidFill>
                 <a:sym typeface="Wingdings" panose="05000000000000000000" pitchFamily="2" charset="2"/>
               </a:rPr>
-              <a:t> Cu</a:t>
+              <a:t> Mg</a:t>
             </a:r>
             <a:r>
               <a:rPr lang="en-US" baseline="-25000" dirty="0">
                 <a:solidFill>
-                  <a:schemeClr val="accent1">
-                    <a:lumMod val="60000"/>
-                    <a:lumOff val="40000"/>
-                  </a:schemeClr>
+                  <a:srgbClr val="FFFF00"/>
+                </a:solidFill>
+                <a:sym typeface="Wingdings" panose="05000000000000000000" pitchFamily="2" charset="2"/>
+              </a:rPr>
+              <a:t>3</a:t>
+            </a:r>
+            <a:r>
+              <a:rPr lang="en-US" dirty="0">
+                <a:solidFill>
+                  <a:srgbClr val="FFFF00"/>
+                </a:solidFill>
+                <a:sym typeface="Wingdings" panose="05000000000000000000" pitchFamily="2" charset="2"/>
+              </a:rPr>
+              <a:t>N</a:t>
+            </a:r>
+            <a:r>
+              <a:rPr lang="en-US" baseline="-25000" dirty="0">
+                <a:solidFill>
+                  <a:srgbClr val="FFFF00"/>
                 </a:solidFill>
                 <a:sym typeface="Wingdings" panose="05000000000000000000" pitchFamily="2" charset="2"/>
               </a:rPr>
@@ -12217,29 +12806,200 @@
             <a:r>
               <a:rPr lang="en-US" dirty="0">
                 <a:solidFill>
-                  <a:schemeClr val="accent1">
-                    <a:lumMod val="60000"/>
-                    <a:lumOff val="40000"/>
-                  </a:schemeClr>
+                  <a:srgbClr val="FFFF00"/>
                 </a:solidFill>
                 <a:sym typeface="Wingdings" panose="05000000000000000000" pitchFamily="2" charset="2"/>
               </a:rPr>
-              <a:t>S (s)</a:t>
+              <a:t> (</a:t>
+            </a:r>
+            <a:r>
+              <a:rPr lang="en-US" i="1" dirty="0">
+                <a:solidFill>
+                  <a:srgbClr val="FFFF00"/>
+                </a:solidFill>
+                <a:sym typeface="Wingdings" panose="05000000000000000000" pitchFamily="2" charset="2"/>
+              </a:rPr>
+              <a:t>s</a:t>
+            </a:r>
+            <a:r>
+              <a:rPr lang="en-US" dirty="0">
+                <a:solidFill>
+                  <a:srgbClr val="FFFF00"/>
+                </a:solidFill>
+                <a:sym typeface="Wingdings" panose="05000000000000000000" pitchFamily="2" charset="2"/>
+              </a:rPr>
+              <a:t>)</a:t>
             </a:r>
             <a:endParaRPr lang="en-US" dirty="0">
               <a:solidFill>
-                <a:schemeClr val="accent1">
-                  <a:lumMod val="60000"/>
-                  <a:lumOff val="40000"/>
-                </a:schemeClr>
+                <a:srgbClr val="FFFF00"/>
               </a:solidFill>
             </a:endParaRPr>
           </a:p>
           <a:p>
+            <a:pPr marL="236538" lvl="1" indent="0">
+              <a:buNone/>
+            </a:pPr>
             <a:r>
               <a:rPr lang="en-US" dirty="0"/>
-              <a:t>You should know how to write &amp; BALANCE this reaction because you should know that copper sulfide is copper (I) sulfide. Note how mass is balanced</a:t>
-            </a:r>
+              <a:t>Adding water to magnesium nitride would produce ammonia gas, but it is probably not enough to detect its odor</a:t>
+            </a:r>
+            <a:br>
+              <a:rPr lang="en-US" dirty="0">
+                <a:solidFill>
+                  <a:srgbClr val="FFC000"/>
+                </a:solidFill>
+              </a:rPr>
+            </a:br>
+            <a:r>
+              <a:rPr lang="en-US" dirty="0">
+                <a:solidFill>
+                  <a:srgbClr val="FFC000"/>
+                </a:solidFill>
+              </a:rPr>
+              <a:t>	Mg</a:t>
+            </a:r>
+            <a:r>
+              <a:rPr lang="en-US" baseline="-25000" dirty="0">
+                <a:solidFill>
+                  <a:srgbClr val="FFC000"/>
+                </a:solidFill>
+              </a:rPr>
+              <a:t>3</a:t>
+            </a:r>
+            <a:r>
+              <a:rPr lang="en-US" dirty="0">
+                <a:solidFill>
+                  <a:srgbClr val="FFC000"/>
+                </a:solidFill>
+              </a:rPr>
+              <a:t>N</a:t>
+            </a:r>
+            <a:r>
+              <a:rPr lang="en-US" baseline="-25000" dirty="0">
+                <a:solidFill>
+                  <a:srgbClr val="FFC000"/>
+                </a:solidFill>
+              </a:rPr>
+              <a:t>2</a:t>
+            </a:r>
+            <a:r>
+              <a:rPr lang="en-US" dirty="0">
+                <a:solidFill>
+                  <a:srgbClr val="FFC000"/>
+                </a:solidFill>
+              </a:rPr>
+              <a:t> (s) + 6 H</a:t>
+            </a:r>
+            <a:r>
+              <a:rPr lang="en-US" baseline="-25000" dirty="0">
+                <a:solidFill>
+                  <a:srgbClr val="FFC000"/>
+                </a:solidFill>
+              </a:rPr>
+              <a:t>2</a:t>
+            </a:r>
+            <a:r>
+              <a:rPr lang="en-US" dirty="0">
+                <a:solidFill>
+                  <a:srgbClr val="FFC000"/>
+                </a:solidFill>
+              </a:rPr>
+              <a:t>O (l) </a:t>
+            </a:r>
+            <a:r>
+              <a:rPr lang="en-US" dirty="0">
+                <a:solidFill>
+                  <a:srgbClr val="FFC000"/>
+                </a:solidFill>
+                <a:sym typeface="Wingdings" panose="05000000000000000000" pitchFamily="2" charset="2"/>
+              </a:rPr>
+              <a:t> 3 Mg(OH)</a:t>
+            </a:r>
+            <a:r>
+              <a:rPr lang="en-US" baseline="-25000" dirty="0">
+                <a:solidFill>
+                  <a:srgbClr val="FFC000"/>
+                </a:solidFill>
+                <a:sym typeface="Wingdings" panose="05000000000000000000" pitchFamily="2" charset="2"/>
+              </a:rPr>
+              <a:t>2</a:t>
+            </a:r>
+            <a:r>
+              <a:rPr lang="en-US" dirty="0">
+                <a:solidFill>
+                  <a:srgbClr val="FFC000"/>
+                </a:solidFill>
+                <a:sym typeface="Wingdings" panose="05000000000000000000" pitchFamily="2" charset="2"/>
+              </a:rPr>
+              <a:t> (</a:t>
+            </a:r>
+            <a:r>
+              <a:rPr lang="en-US" i="1" dirty="0" err="1">
+                <a:solidFill>
+                  <a:srgbClr val="FFC000"/>
+                </a:solidFill>
+                <a:sym typeface="Wingdings" panose="05000000000000000000" pitchFamily="2" charset="2"/>
+              </a:rPr>
+              <a:t>aq</a:t>
+            </a:r>
+            <a:r>
+              <a:rPr lang="en-US" dirty="0">
+                <a:solidFill>
+                  <a:srgbClr val="FFC000"/>
+                </a:solidFill>
+                <a:sym typeface="Wingdings" panose="05000000000000000000" pitchFamily="2" charset="2"/>
+              </a:rPr>
+              <a:t>) + 2 NH</a:t>
+            </a:r>
+            <a:r>
+              <a:rPr lang="en-US" baseline="-25000" dirty="0">
+                <a:solidFill>
+                  <a:srgbClr val="FFC000"/>
+                </a:solidFill>
+                <a:sym typeface="Wingdings" panose="05000000000000000000" pitchFamily="2" charset="2"/>
+              </a:rPr>
+              <a:t>3</a:t>
+            </a:r>
+            <a:r>
+              <a:rPr lang="en-US" dirty="0">
+                <a:solidFill>
+                  <a:srgbClr val="FFC000"/>
+                </a:solidFill>
+                <a:sym typeface="Wingdings" panose="05000000000000000000" pitchFamily="2" charset="2"/>
+              </a:rPr>
+              <a:t> (</a:t>
+            </a:r>
+            <a:r>
+              <a:rPr lang="en-US" i="1" dirty="0">
+                <a:solidFill>
+                  <a:srgbClr val="FFC000"/>
+                </a:solidFill>
+                <a:sym typeface="Wingdings" panose="05000000000000000000" pitchFamily="2" charset="2"/>
+              </a:rPr>
+              <a:t>g</a:t>
+            </a:r>
+            <a:r>
+              <a:rPr lang="en-US" dirty="0">
+                <a:solidFill>
+                  <a:srgbClr val="FFC000"/>
+                </a:solidFill>
+                <a:sym typeface="Wingdings" panose="05000000000000000000" pitchFamily="2" charset="2"/>
+              </a:rPr>
+              <a:t>)</a:t>
+            </a:r>
+            <a:endParaRPr lang="en-US" dirty="0">
+              <a:solidFill>
+                <a:srgbClr val="FFC000"/>
+              </a:solidFill>
+            </a:endParaRPr>
+          </a:p>
+          <a:p>
+            <a:pPr marL="457200" indent="-457200">
+              <a:buFont typeface="+mj-lt"/>
+              <a:buAutoNum type="arabicPeriod"/>
+            </a:pPr>
+            <a:endParaRPr lang="en-US" baseline="-25000" dirty="0"/>
           </a:p>
         </p:txBody>
       </p:sp>
@@ -12257,671 +13017,6 @@
 </file>
 
 <file path=ppt/slides/slide6.xml><?xml version="1.0" encoding="utf-8"?>
-<p:sld xmlns:a="http://schemas.openxmlformats.org/drawingml/2006/main" xmlns:r="http://schemas.openxmlformats.org/officeDocument/2006/relationships" xmlns:p="http://schemas.openxmlformats.org/presentationml/2006/main">
-  <p:cSld>
-    <p:spTree>
-      <p:nvGrpSpPr>
-        <p:cNvPr id="1" name="">
-          <a:extLst>
-            <a:ext uri="{FF2B5EF4-FFF2-40B4-BE49-F238E27FC236}">
-              <a16:creationId xmlns:a16="http://schemas.microsoft.com/office/drawing/2014/main" id="{A0B314F5-A532-75E0-4452-699E381E2923}"/>
-            </a:ext>
-          </a:extLst>
-        </p:cNvPr>
-        <p:cNvGrpSpPr/>
-        <p:nvPr/>
-      </p:nvGrpSpPr>
-      <p:grpSpPr>
-        <a:xfrm>
-          <a:off x="0" y="0"/>
-          <a:ext cx="0" cy="0"/>
-          <a:chOff x="0" y="0"/>
-          <a:chExt cx="0" cy="0"/>
-        </a:xfrm>
-      </p:grpSpPr>
-      <p:sp>
-        <p:nvSpPr>
-          <p:cNvPr id="2" name="Title 1">
-            <a:extLst>
-              <a:ext uri="{FF2B5EF4-FFF2-40B4-BE49-F238E27FC236}">
-                <a16:creationId xmlns:a16="http://schemas.microsoft.com/office/drawing/2014/main" id="{7B67D3B4-D5D4-23E8-8C4C-0BC5FF420E12}"/>
-              </a:ext>
-            </a:extLst>
-          </p:cNvPr>
-          <p:cNvSpPr>
-            <a:spLocks noGrp="1"/>
-          </p:cNvSpPr>
-          <p:nvPr>
-            <p:ph type="title"/>
-          </p:nvPr>
-        </p:nvSpPr>
-        <p:spPr/>
-        <p:txBody>
-          <a:bodyPr/>
-          <a:lstStyle/>
-          <a:p>
-            <a:r>
-              <a:rPr lang="en-US" dirty="0"/>
-              <a:t>Experiment Planning</a:t>
-            </a:r>
-          </a:p>
-        </p:txBody>
-      </p:sp>
-      <mc:AlternateContent xmlns:mc="http://schemas.openxmlformats.org/markup-compatibility/2006" xmlns:a14="http://schemas.microsoft.com/office/drawing/2010/main">
-        <mc:Choice Requires="a14">
-          <p:sp>
-            <p:nvSpPr>
-              <p:cNvPr id="3" name="Content Placeholder 2">
-                <a:extLst>
-                  <a:ext uri="{FF2B5EF4-FFF2-40B4-BE49-F238E27FC236}">
-                    <a16:creationId xmlns:a16="http://schemas.microsoft.com/office/drawing/2014/main" id="{10F096D7-7F9F-3A76-824B-79A56486284F}"/>
-                  </a:ext>
-                </a:extLst>
-              </p:cNvPr>
-              <p:cNvSpPr>
-                <a:spLocks noGrp="1"/>
-              </p:cNvSpPr>
-              <p:nvPr>
-                <p:ph idx="1"/>
-              </p:nvPr>
-            </p:nvSpPr>
-            <p:spPr/>
-            <p:txBody>
-              <a:bodyPr/>
-              <a:lstStyle/>
-              <a:p>
-                <a:r>
-                  <a:rPr lang="en-US" dirty="0"/>
-                  <a:t>The next step is to know the molar mass of the reactants and the product</a:t>
-                </a:r>
-              </a:p>
-              <a:p>
-                <a:pPr lvl="1"/>
-                <a:r>
-                  <a:rPr lang="en-US" sz="2200" dirty="0">
-                    <a:solidFill>
-                      <a:srgbClr val="FFC000"/>
-                    </a:solidFill>
-                  </a:rPr>
-                  <a:t>Copper</a:t>
-                </a:r>
-                <a:r>
-                  <a:rPr lang="en-US" sz="2200" dirty="0"/>
-                  <a:t>: </a:t>
-                </a:r>
-                <a:r>
-                  <a:rPr lang="en-US" sz="2200" dirty="0">
-                    <a:solidFill>
-                      <a:schemeClr val="accent1">
-                        <a:lumMod val="60000"/>
-                        <a:lumOff val="40000"/>
-                      </a:schemeClr>
-                    </a:solidFill>
-                  </a:rPr>
-                  <a:t>63.546 g/mol</a:t>
-                </a:r>
-              </a:p>
-              <a:p>
-                <a:pPr lvl="1"/>
-                <a:r>
-                  <a:rPr lang="en-US" sz="2200" dirty="0">
-                    <a:solidFill>
-                      <a:srgbClr val="FFC000"/>
-                    </a:solidFill>
-                  </a:rPr>
-                  <a:t>Sulfur</a:t>
-                </a:r>
-                <a:r>
-                  <a:rPr lang="en-US" sz="2200" dirty="0"/>
-                  <a:t>: </a:t>
-                </a:r>
-                <a:r>
-                  <a:rPr lang="en-US" sz="2200" dirty="0">
-                    <a:solidFill>
-                      <a:schemeClr val="accent1">
-                        <a:lumMod val="60000"/>
-                        <a:lumOff val="40000"/>
-                      </a:schemeClr>
-                    </a:solidFill>
-                  </a:rPr>
-                  <a:t>32.065 g/mol</a:t>
-                </a:r>
-              </a:p>
-              <a:p>
-                <a:pPr lvl="1"/>
-                <a:r>
-                  <a:rPr lang="en-US" sz="2200" dirty="0">
-                    <a:solidFill>
-                      <a:srgbClr val="FFC000"/>
-                    </a:solidFill>
-                  </a:rPr>
-                  <a:t>Copper</a:t>
-                </a:r>
-                <a:r>
-                  <a:rPr lang="en-US" sz="2200" dirty="0"/>
-                  <a:t> </a:t>
-                </a:r>
-                <a:r>
-                  <a:rPr lang="en-US" sz="2200" dirty="0">
-                    <a:solidFill>
-                      <a:srgbClr val="FFC000"/>
-                    </a:solidFill>
-                  </a:rPr>
-                  <a:t>(I) sulfide</a:t>
-                </a:r>
-                <a:r>
-                  <a:rPr lang="en-US" sz="2200" dirty="0"/>
-                  <a:t>: 2 × </a:t>
-                </a:r>
-                <a:r>
-                  <a:rPr lang="en-US" sz="2200" dirty="0">
-                    <a:solidFill>
-                      <a:srgbClr val="FFFF00"/>
-                    </a:solidFill>
-                  </a:rPr>
-                  <a:t>Cu</a:t>
-                </a:r>
-                <a:r>
-                  <a:rPr lang="en-US" sz="2200" dirty="0"/>
-                  <a:t> + </a:t>
-                </a:r>
-                <a:r>
-                  <a:rPr lang="en-US" sz="2200" dirty="0">
-                    <a:solidFill>
-                      <a:srgbClr val="FFFF00"/>
-                    </a:solidFill>
-                  </a:rPr>
-                  <a:t>S</a:t>
-                </a:r>
-                <a:r>
-                  <a:rPr lang="en-US" sz="2200" dirty="0"/>
-                  <a:t> = </a:t>
-                </a:r>
-                <a:r>
-                  <a:rPr lang="en-US" sz="2200" dirty="0">
-                    <a:solidFill>
-                      <a:schemeClr val="accent1">
-                        <a:lumMod val="60000"/>
-                        <a:lumOff val="40000"/>
-                      </a:schemeClr>
-                    </a:solidFill>
-                  </a:rPr>
-                  <a:t>159.16 g/mol</a:t>
-                </a:r>
-              </a:p>
-              <a:p>
-                <a:r>
-                  <a:rPr lang="en-US" sz="2200" dirty="0"/>
-                  <a:t>Two atoms of Cu will be used for every one atom of S</a:t>
-                </a:r>
-              </a:p>
-              <a:p>
-                <a:r>
-                  <a:rPr lang="en-US" sz="2200" dirty="0"/>
-                  <a:t>Two MOLES (mol) of Cu will be used for every one MOLE (mol) of S</a:t>
-                </a:r>
-              </a:p>
-              <a:p>
-                <a:r>
-                  <a:rPr lang="en-US" sz="2200" dirty="0"/>
-                  <a:t>You have 2.00 g S: how many g of Cu will it change?</a:t>
-                </a:r>
-              </a:p>
-              <a:p>
-                <a14:m>
-                  <m:oMath xmlns:m="http://schemas.openxmlformats.org/officeDocument/2006/math">
-                    <m:r>
-                      <a:rPr lang="en-US" sz="2200" b="0" i="1" smtClean="0">
-                        <a:latin typeface="Cambria Math" panose="02040503050406030204" pitchFamily="18" charset="0"/>
-                      </a:rPr>
-                      <m:t>2.00 </m:t>
-                    </m:r>
-                    <m:r>
-                      <m:rPr>
-                        <m:nor/>
-                      </m:rPr>
-                      <a:rPr lang="en-US" sz="2200" b="0" i="0" smtClean="0">
-                        <a:latin typeface="Cambria Math" panose="02040503050406030204" pitchFamily="18" charset="0"/>
-                      </a:rPr>
-                      <m:t>g</m:t>
-                    </m:r>
-                    <m:r>
-                      <m:rPr>
-                        <m:nor/>
-                      </m:rPr>
-                      <a:rPr lang="en-US" sz="2200" b="0" i="0" smtClean="0">
-                        <a:latin typeface="Cambria Math" panose="02040503050406030204" pitchFamily="18" charset="0"/>
-                      </a:rPr>
-                      <m:t> </m:t>
-                    </m:r>
-                    <m:r>
-                      <m:rPr>
-                        <m:nor/>
-                      </m:rPr>
-                      <a:rPr lang="en-US" sz="2200" b="0" i="0" smtClean="0">
-                        <a:latin typeface="Cambria Math" panose="02040503050406030204" pitchFamily="18" charset="0"/>
-                      </a:rPr>
-                      <m:t>S</m:t>
-                    </m:r>
-                    <m:r>
-                      <a:rPr lang="en-US" sz="2200" b="0" i="1" smtClean="0">
-                        <a:latin typeface="Cambria Math" panose="02040503050406030204" pitchFamily="18" charset="0"/>
-                        <a:ea typeface="Cambria Math" panose="02040503050406030204" pitchFamily="18" charset="0"/>
-                      </a:rPr>
-                      <m:t>×</m:t>
-                    </m:r>
-                    <m:f>
-                      <m:fPr>
-                        <m:ctrlPr>
-                          <a:rPr lang="en-US" sz="2200" b="0" i="1" smtClean="0">
-                            <a:latin typeface="Cambria Math" panose="02040503050406030204" pitchFamily="18" charset="0"/>
-                            <a:ea typeface="Cambria Math" panose="02040503050406030204" pitchFamily="18" charset="0"/>
-                          </a:rPr>
-                        </m:ctrlPr>
-                      </m:fPr>
-                      <m:num>
-                        <m:r>
-                          <m:rPr>
-                            <m:nor/>
-                          </m:rPr>
-                          <a:rPr lang="en-US" sz="2200" b="0" i="0" smtClean="0">
-                            <a:latin typeface="Cambria Math" panose="02040503050406030204" pitchFamily="18" charset="0"/>
-                            <a:ea typeface="Cambria Math" panose="02040503050406030204" pitchFamily="18" charset="0"/>
-                          </a:rPr>
-                          <m:t>1 </m:t>
-                        </m:r>
-                        <m:r>
-                          <m:rPr>
-                            <m:nor/>
-                          </m:rPr>
-                          <a:rPr lang="en-US" sz="2200" b="0" i="0" smtClean="0">
-                            <a:latin typeface="Cambria Math" panose="02040503050406030204" pitchFamily="18" charset="0"/>
-                            <a:ea typeface="Cambria Math" panose="02040503050406030204" pitchFamily="18" charset="0"/>
-                          </a:rPr>
-                          <m:t>mol</m:t>
-                        </m:r>
-                        <m:r>
-                          <m:rPr>
-                            <m:nor/>
-                          </m:rPr>
-                          <a:rPr lang="en-US" sz="2200" b="0" i="0" smtClean="0">
-                            <a:latin typeface="Cambria Math" panose="02040503050406030204" pitchFamily="18" charset="0"/>
-                            <a:ea typeface="Cambria Math" panose="02040503050406030204" pitchFamily="18" charset="0"/>
-                          </a:rPr>
-                          <m:t> </m:t>
-                        </m:r>
-                        <m:r>
-                          <m:rPr>
-                            <m:nor/>
-                          </m:rPr>
-                          <a:rPr lang="en-US" sz="2200" b="0" i="0" smtClean="0">
-                            <a:latin typeface="Cambria Math" panose="02040503050406030204" pitchFamily="18" charset="0"/>
-                            <a:ea typeface="Cambria Math" panose="02040503050406030204" pitchFamily="18" charset="0"/>
-                          </a:rPr>
-                          <m:t>S</m:t>
-                        </m:r>
-                      </m:num>
-                      <m:den>
-                        <m:r>
-                          <m:rPr>
-                            <m:nor/>
-                          </m:rPr>
-                          <a:rPr lang="en-US" sz="2200" b="0" i="0" smtClean="0">
-                            <a:latin typeface="Cambria Math" panose="02040503050406030204" pitchFamily="18" charset="0"/>
-                            <a:ea typeface="Cambria Math" panose="02040503050406030204" pitchFamily="18" charset="0"/>
-                          </a:rPr>
-                          <m:t>32.065 </m:t>
-                        </m:r>
-                        <m:r>
-                          <m:rPr>
-                            <m:nor/>
-                          </m:rPr>
-                          <a:rPr lang="en-US" sz="2200" b="0" i="0" smtClean="0">
-                            <a:latin typeface="Cambria Math" panose="02040503050406030204" pitchFamily="18" charset="0"/>
-                            <a:ea typeface="Cambria Math" panose="02040503050406030204" pitchFamily="18" charset="0"/>
-                          </a:rPr>
-                          <m:t>g</m:t>
-                        </m:r>
-                        <m:r>
-                          <m:rPr>
-                            <m:nor/>
-                          </m:rPr>
-                          <a:rPr lang="en-US" sz="2200" b="0" i="0" smtClean="0">
-                            <a:latin typeface="Cambria Math" panose="02040503050406030204" pitchFamily="18" charset="0"/>
-                            <a:ea typeface="Cambria Math" panose="02040503050406030204" pitchFamily="18" charset="0"/>
-                          </a:rPr>
-                          <m:t> </m:t>
-                        </m:r>
-                        <m:r>
-                          <m:rPr>
-                            <m:nor/>
-                          </m:rPr>
-                          <a:rPr lang="en-US" sz="2200" b="0" i="0" smtClean="0">
-                            <a:latin typeface="Cambria Math" panose="02040503050406030204" pitchFamily="18" charset="0"/>
-                            <a:ea typeface="Cambria Math" panose="02040503050406030204" pitchFamily="18" charset="0"/>
-                          </a:rPr>
-                          <m:t>S</m:t>
-                        </m:r>
-                      </m:den>
-                    </m:f>
-                    <m:r>
-                      <a:rPr lang="en-US" sz="2200" b="0" i="1" smtClean="0">
-                        <a:latin typeface="Cambria Math" panose="02040503050406030204" pitchFamily="18" charset="0"/>
-                        <a:ea typeface="Cambria Math" panose="02040503050406030204" pitchFamily="18" charset="0"/>
-                      </a:rPr>
-                      <m:t>×</m:t>
-                    </m:r>
-                    <m:f>
-                      <m:fPr>
-                        <m:ctrlPr>
-                          <a:rPr lang="en-US" sz="2200" b="0" i="1" smtClean="0">
-                            <a:latin typeface="Cambria Math" panose="02040503050406030204" pitchFamily="18" charset="0"/>
-                            <a:ea typeface="Cambria Math" panose="02040503050406030204" pitchFamily="18" charset="0"/>
-                          </a:rPr>
-                        </m:ctrlPr>
-                      </m:fPr>
-                      <m:num>
-                        <m:r>
-                          <m:rPr>
-                            <m:nor/>
-                          </m:rPr>
-                          <a:rPr lang="en-US" sz="2200" b="0" i="0" smtClean="0">
-                            <a:latin typeface="Cambria Math" panose="02040503050406030204" pitchFamily="18" charset="0"/>
-                            <a:ea typeface="Cambria Math" panose="02040503050406030204" pitchFamily="18" charset="0"/>
-                          </a:rPr>
-                          <m:t>2 </m:t>
-                        </m:r>
-                        <m:r>
-                          <m:rPr>
-                            <m:nor/>
-                          </m:rPr>
-                          <a:rPr lang="en-US" sz="2200" b="0" i="0" smtClean="0">
-                            <a:latin typeface="Cambria Math" panose="02040503050406030204" pitchFamily="18" charset="0"/>
-                            <a:ea typeface="Cambria Math" panose="02040503050406030204" pitchFamily="18" charset="0"/>
-                          </a:rPr>
-                          <m:t>mol</m:t>
-                        </m:r>
-                        <m:r>
-                          <m:rPr>
-                            <m:nor/>
-                          </m:rPr>
-                          <a:rPr lang="en-US" sz="2200" b="0" i="0" smtClean="0">
-                            <a:latin typeface="Cambria Math" panose="02040503050406030204" pitchFamily="18" charset="0"/>
-                            <a:ea typeface="Cambria Math" panose="02040503050406030204" pitchFamily="18" charset="0"/>
-                          </a:rPr>
-                          <m:t> </m:t>
-                        </m:r>
-                        <m:r>
-                          <m:rPr>
-                            <m:nor/>
-                          </m:rPr>
-                          <a:rPr lang="en-US" sz="2200" b="0" i="0" smtClean="0">
-                            <a:latin typeface="Cambria Math" panose="02040503050406030204" pitchFamily="18" charset="0"/>
-                            <a:ea typeface="Cambria Math" panose="02040503050406030204" pitchFamily="18" charset="0"/>
-                          </a:rPr>
-                          <m:t>Cu</m:t>
-                        </m:r>
-                      </m:num>
-                      <m:den>
-                        <m:r>
-                          <m:rPr>
-                            <m:nor/>
-                          </m:rPr>
-                          <a:rPr lang="en-US" sz="2200" b="0" i="0" smtClean="0">
-                            <a:latin typeface="Cambria Math" panose="02040503050406030204" pitchFamily="18" charset="0"/>
-                            <a:ea typeface="Cambria Math" panose="02040503050406030204" pitchFamily="18" charset="0"/>
-                          </a:rPr>
-                          <m:t>1 </m:t>
-                        </m:r>
-                        <m:r>
-                          <m:rPr>
-                            <m:nor/>
-                          </m:rPr>
-                          <a:rPr lang="en-US" sz="2200" b="0" i="0" smtClean="0">
-                            <a:latin typeface="Cambria Math" panose="02040503050406030204" pitchFamily="18" charset="0"/>
-                            <a:ea typeface="Cambria Math" panose="02040503050406030204" pitchFamily="18" charset="0"/>
-                          </a:rPr>
-                          <m:t>mol</m:t>
-                        </m:r>
-                        <m:r>
-                          <m:rPr>
-                            <m:nor/>
-                          </m:rPr>
-                          <a:rPr lang="en-US" sz="2200" b="0" i="0" smtClean="0">
-                            <a:latin typeface="Cambria Math" panose="02040503050406030204" pitchFamily="18" charset="0"/>
-                            <a:ea typeface="Cambria Math" panose="02040503050406030204" pitchFamily="18" charset="0"/>
-                          </a:rPr>
-                          <m:t> </m:t>
-                        </m:r>
-                        <m:r>
-                          <m:rPr>
-                            <m:nor/>
-                          </m:rPr>
-                          <a:rPr lang="en-US" sz="2200" b="0" i="0" smtClean="0">
-                            <a:latin typeface="Cambria Math" panose="02040503050406030204" pitchFamily="18" charset="0"/>
-                            <a:ea typeface="Cambria Math" panose="02040503050406030204" pitchFamily="18" charset="0"/>
-                          </a:rPr>
-                          <m:t>S</m:t>
-                        </m:r>
-                      </m:den>
-                    </m:f>
-                    <m:r>
-                      <m:rPr>
-                        <m:nor/>
-                      </m:rPr>
-                      <a:rPr lang="en-US" sz="2200" b="0" i="0" smtClean="0">
-                        <a:latin typeface="Cambria Math" panose="02040503050406030204" pitchFamily="18" charset="0"/>
-                        <a:ea typeface="Cambria Math" panose="02040503050406030204" pitchFamily="18" charset="0"/>
-                      </a:rPr>
-                      <m:t>×</m:t>
-                    </m:r>
-                    <m:f>
-                      <m:fPr>
-                        <m:ctrlPr>
-                          <a:rPr lang="en-US" sz="2200" b="0" i="1" smtClean="0">
-                            <a:latin typeface="Cambria Math" panose="02040503050406030204" pitchFamily="18" charset="0"/>
-                            <a:ea typeface="Cambria Math" panose="02040503050406030204" pitchFamily="18" charset="0"/>
-                          </a:rPr>
-                        </m:ctrlPr>
-                      </m:fPr>
-                      <m:num>
-                        <m:r>
-                          <m:rPr>
-                            <m:nor/>
-                          </m:rPr>
-                          <a:rPr lang="en-US" sz="2200" b="0" i="0" smtClean="0">
-                            <a:latin typeface="Cambria Math" panose="02040503050406030204" pitchFamily="18" charset="0"/>
-                            <a:ea typeface="Cambria Math" panose="02040503050406030204" pitchFamily="18" charset="0"/>
-                          </a:rPr>
-                          <m:t>63.546 </m:t>
-                        </m:r>
-                        <m:r>
-                          <m:rPr>
-                            <m:nor/>
-                          </m:rPr>
-                          <a:rPr lang="en-US" sz="2200" b="0" i="0" smtClean="0">
-                            <a:latin typeface="Cambria Math" panose="02040503050406030204" pitchFamily="18" charset="0"/>
-                            <a:ea typeface="Cambria Math" panose="02040503050406030204" pitchFamily="18" charset="0"/>
-                          </a:rPr>
-                          <m:t>g</m:t>
-                        </m:r>
-                        <m:r>
-                          <m:rPr>
-                            <m:nor/>
-                          </m:rPr>
-                          <a:rPr lang="en-US" sz="2200" b="0" i="0" smtClean="0">
-                            <a:latin typeface="Cambria Math" panose="02040503050406030204" pitchFamily="18" charset="0"/>
-                            <a:ea typeface="Cambria Math" panose="02040503050406030204" pitchFamily="18" charset="0"/>
-                          </a:rPr>
-                          <m:t> </m:t>
-                        </m:r>
-                        <m:r>
-                          <m:rPr>
-                            <m:nor/>
-                          </m:rPr>
-                          <a:rPr lang="en-US" sz="2200" b="0" i="0" smtClean="0">
-                            <a:latin typeface="Cambria Math" panose="02040503050406030204" pitchFamily="18" charset="0"/>
-                            <a:ea typeface="Cambria Math" panose="02040503050406030204" pitchFamily="18" charset="0"/>
-                          </a:rPr>
-                          <m:t>Cu</m:t>
-                        </m:r>
-                      </m:num>
-                      <m:den>
-                        <m:r>
-                          <m:rPr>
-                            <m:nor/>
-                          </m:rPr>
-                          <a:rPr lang="en-US" sz="2200" b="0" i="0" smtClean="0">
-                            <a:latin typeface="Cambria Math" panose="02040503050406030204" pitchFamily="18" charset="0"/>
-                            <a:ea typeface="Cambria Math" panose="02040503050406030204" pitchFamily="18" charset="0"/>
-                          </a:rPr>
-                          <m:t>1 </m:t>
-                        </m:r>
-                        <m:r>
-                          <m:rPr>
-                            <m:nor/>
-                          </m:rPr>
-                          <a:rPr lang="en-US" sz="2200" b="0" i="0" smtClean="0">
-                            <a:latin typeface="Cambria Math" panose="02040503050406030204" pitchFamily="18" charset="0"/>
-                            <a:ea typeface="Cambria Math" panose="02040503050406030204" pitchFamily="18" charset="0"/>
-                          </a:rPr>
-                          <m:t>mol</m:t>
-                        </m:r>
-                        <m:r>
-                          <m:rPr>
-                            <m:nor/>
-                          </m:rPr>
-                          <a:rPr lang="en-US" sz="2200" b="0" i="0" smtClean="0">
-                            <a:latin typeface="Cambria Math" panose="02040503050406030204" pitchFamily="18" charset="0"/>
-                            <a:ea typeface="Cambria Math" panose="02040503050406030204" pitchFamily="18" charset="0"/>
-                          </a:rPr>
-                          <m:t> </m:t>
-                        </m:r>
-                        <m:r>
-                          <m:rPr>
-                            <m:nor/>
-                          </m:rPr>
-                          <a:rPr lang="en-US" sz="2200" b="0" i="0" smtClean="0">
-                            <a:latin typeface="Cambria Math" panose="02040503050406030204" pitchFamily="18" charset="0"/>
-                            <a:ea typeface="Cambria Math" panose="02040503050406030204" pitchFamily="18" charset="0"/>
-                          </a:rPr>
-                          <m:t>Cu</m:t>
-                        </m:r>
-                      </m:den>
-                    </m:f>
-                    <m:r>
-                      <m:rPr>
-                        <m:nor/>
-                      </m:rPr>
-                      <a:rPr lang="en-US" sz="2200" b="0" i="0" smtClean="0">
-                        <a:latin typeface="Cambria Math" panose="02040503050406030204" pitchFamily="18" charset="0"/>
-                        <a:ea typeface="Cambria Math" panose="02040503050406030204" pitchFamily="18" charset="0"/>
-                      </a:rPr>
-                      <m:t>=</m:t>
-                    </m:r>
-                    <m:r>
-                      <m:rPr>
-                        <m:nor/>
-                      </m:rPr>
-                      <a:rPr lang="en-US" sz="2200" b="0" i="0" smtClean="0">
-                        <a:latin typeface="Cambria Math" panose="02040503050406030204" pitchFamily="18" charset="0"/>
-                      </a:rPr>
-                      <m:t> 7.93 </m:t>
-                    </m:r>
-                    <m:r>
-                      <m:rPr>
-                        <m:nor/>
-                      </m:rPr>
-                      <a:rPr lang="en-US" sz="2200" b="0" i="0" smtClean="0">
-                        <a:latin typeface="Cambria Math" panose="02040503050406030204" pitchFamily="18" charset="0"/>
-                      </a:rPr>
-                      <m:t>g</m:t>
-                    </m:r>
-                    <m:r>
-                      <m:rPr>
-                        <m:nor/>
-                      </m:rPr>
-                      <a:rPr lang="en-US" sz="2200" b="0" i="0" smtClean="0">
-                        <a:latin typeface="Cambria Math" panose="02040503050406030204" pitchFamily="18" charset="0"/>
-                      </a:rPr>
-                      <m:t> </m:t>
-                    </m:r>
-                    <m:r>
-                      <m:rPr>
-                        <m:nor/>
-                      </m:rPr>
-                      <a:rPr lang="en-US" sz="2200" b="0" i="0" smtClean="0">
-                        <a:latin typeface="Cambria Math" panose="02040503050406030204" pitchFamily="18" charset="0"/>
-                      </a:rPr>
-                      <m:t>Cu</m:t>
-                    </m:r>
-                  </m:oMath>
-                </a14:m>
-                <a:endParaRPr lang="en-US" sz="2200" dirty="0"/>
-              </a:p>
-              <a:p>
-                <a:r>
-                  <a:rPr lang="en-US" sz="2200" dirty="0"/>
-                  <a:t>If you consider you can weigh out up to 4.00 g S, then you could consume as much as ~16 g Cu</a:t>
-                </a:r>
-              </a:p>
-            </p:txBody>
-          </p:sp>
-        </mc:Choice>
-        <mc:Fallback xmlns="">
-          <p:sp>
-            <p:nvSpPr>
-              <p:cNvPr id="3" name="Content Placeholder 2">
-                <a:extLst>
-                  <a:ext uri="{FF2B5EF4-FFF2-40B4-BE49-F238E27FC236}">
-                    <a16:creationId xmlns:a16="http://schemas.microsoft.com/office/drawing/2014/main" id="{10F096D7-7F9F-3A76-824B-79A56486284F}"/>
-                  </a:ext>
-                </a:extLst>
-              </p:cNvPr>
-              <p:cNvSpPr>
-                <a:spLocks noGrp="1" noRot="1" noChangeAspect="1" noMove="1" noResize="1" noEditPoints="1" noAdjustHandles="1" noChangeArrowheads="1" noChangeShapeType="1" noTextEdit="1"/>
-              </p:cNvSpPr>
-              <p:nvPr>
-                <p:ph idx="1"/>
-              </p:nvPr>
-            </p:nvSpPr>
-            <p:spPr>
-              <a:blipFill>
-                <a:blip r:embed="rId2"/>
-                <a:stretch>
-                  <a:fillRect l="-1090" t="-936"/>
-                </a:stretch>
-              </a:blipFill>
-            </p:spPr>
-            <p:txBody>
-              <a:bodyPr/>
-              <a:lstStyle/>
-              <a:p>
-                <a:r>
-                  <a:rPr lang="en-US">
-                    <a:noFill/>
-                  </a:rPr>
-                  <a:t> </a:t>
-                </a:r>
-              </a:p>
-            </p:txBody>
-          </p:sp>
-        </mc:Fallback>
-      </mc:AlternateContent>
-    </p:spTree>
-    <p:extLst>
-      <p:ext uri="{BB962C8B-B14F-4D97-AF65-F5344CB8AC3E}">
-        <p14:creationId xmlns:p14="http://schemas.microsoft.com/office/powerpoint/2010/main" val="1120309110"/>
-      </p:ext>
-    </p:extLst>
-  </p:cSld>
-  <p:clrMapOvr>
-    <a:masterClrMapping/>
-  </p:clrMapOvr>
-</p:sld>
-</file>
-
-<file path=ppt/slides/slide7.xml><?xml version="1.0" encoding="utf-8"?>
 <p:sld xmlns:a="http://schemas.openxmlformats.org/drawingml/2006/main" xmlns:r="http://schemas.openxmlformats.org/officeDocument/2006/relationships" xmlns:p="http://schemas.openxmlformats.org/presentationml/2006/main">
   <p:cSld>
     <p:spTree>
@@ -13045,7 +13140,7 @@
 </p:sld>
 </file>
 
-<file path=ppt/slides/slide8.xml><?xml version="1.0" encoding="utf-8"?>
+<file path=ppt/slides/slide7.xml><?xml version="1.0" encoding="utf-8"?>
 <p:sld xmlns:a="http://schemas.openxmlformats.org/drawingml/2006/main" xmlns:r="http://schemas.openxmlformats.org/officeDocument/2006/relationships" xmlns:p="http://schemas.openxmlformats.org/presentationml/2006/main">
   <p:cSld>
     <p:spTree>
@@ -13095,8 +13190,8 @@
           <a:lstStyle/>
           <a:p>
             <a:r>
-              <a:rPr lang="en-US" sz="4400" dirty="0"/>
-              <a:t>Procedure</a:t>
+              <a:rPr lang="en-US" sz="4400" b="1" dirty="0"/>
+              <a:t>Lab Safety</a:t>
             </a:r>
           </a:p>
         </p:txBody>
@@ -13127,67 +13222,48 @@
           <a:bodyPr/>
           <a:lstStyle/>
           <a:p>
+            <a:r>
+              <a:rPr lang="en-US" sz="2800" b="1" dirty="0"/>
+              <a:t>Goggles</a:t>
+            </a:r>
+          </a:p>
+          <a:p>
+            <a:r>
+              <a:rPr lang="en-US" sz="2800" b="1" dirty="0"/>
+              <a:t>Correct Laboratory Coat</a:t>
+            </a:r>
+          </a:p>
+          <a:p>
+            <a:r>
+              <a:rPr lang="en-US" sz="2800" b="1" dirty="0"/>
+              <a:t>Gloves (nitrile of proper size)</a:t>
+            </a:r>
+          </a:p>
+          <a:p>
+            <a:endParaRPr lang="en-US" sz="2800" dirty="0"/>
+          </a:p>
+          <a:p>
             <a:pPr marL="0" indent="0">
               <a:buNone/>
             </a:pPr>
             <a:r>
-              <a:rPr lang="en-US" sz="2800" i="1" dirty="0">
-                <a:solidFill>
-                  <a:srgbClr val="00FF00"/>
-                </a:solidFill>
-              </a:rPr>
-              <a:t>Cleaning the Crucible</a:t>
-            </a:r>
-          </a:p>
-          <a:p>
-            <a:pPr marL="457200" indent="-457200">
-              <a:buFont typeface="+mj-lt"/>
-              <a:buAutoNum type="arabicPeriod"/>
-            </a:pPr>
-            <a:r>
-              <a:rPr lang="en-US" sz="2800" dirty="0"/>
-              <a:t>If crucible dirty, use small steel wool piece to scrape out solids. Wipe with dry paper towel</a:t>
-            </a:r>
-          </a:p>
-          <a:p>
-            <a:pPr marL="457200" indent="-457200">
-              <a:buFont typeface="+mj-lt"/>
-              <a:buAutoNum type="arabicPeriod"/>
-            </a:pPr>
-            <a:r>
-              <a:rPr lang="en-US" sz="2800" dirty="0"/>
-              <a:t>Put crucible on stand and heat with blue-coned flame until slightly red hot</a:t>
-            </a:r>
-          </a:p>
-          <a:p>
-            <a:pPr marL="457200" indent="-457200">
-              <a:buFont typeface="+mj-lt"/>
-              <a:buAutoNum type="arabicPeriod"/>
-            </a:pPr>
-            <a:r>
-              <a:rPr lang="en-US" sz="2800" dirty="0"/>
-              <a:t>Use tongs to set crucible on wire mesh and let cool to room temperature (~5 minutes)</a:t>
+              <a:rPr lang="en-US" dirty="0"/>
+              <a:t>Magnesium turnings/shavings can burn hot and can possibly burn through gloves, so you will keep your gloved hands a very respectable distance from crucible and use tongs to hold any crucible that has a burning reaction</a:t>
             </a:r>
           </a:p>
           <a:p>
             <a:pPr marL="0" indent="0">
               <a:buNone/>
             </a:pPr>
-            <a:r>
-              <a:rPr lang="en-US" sz="2800" dirty="0"/>
-              <a:t>DO NOT SET ANY </a:t>
-            </a:r>
-            <a:r>
-              <a:rPr lang="en-US" sz="3200" b="1" dirty="0">
-                <a:solidFill>
-                  <a:srgbClr val="FF0066"/>
-                </a:solidFill>
-              </a:rPr>
-              <a:t>HOT</a:t>
-            </a:r>
-            <a:r>
-              <a:rPr lang="en-US" sz="2800" dirty="0"/>
-              <a:t> CRUCIBLE ON COUNTERTOP OR ON PAPER OR THEY CAN BURN!</a:t>
+            <a:endParaRPr lang="en-US" dirty="0"/>
+          </a:p>
+          <a:p>
+            <a:pPr marL="0" indent="0">
+              <a:buNone/>
+            </a:pPr>
+            <a:r>
+              <a:rPr lang="en-US" dirty="0"/>
+              <a:t>Magnesium can burn BRIGHTLY so do not look directly at burning Mg for any long time</a:t>
             </a:r>
           </a:p>
         </p:txBody>
@@ -13205,7 +13281,7 @@
 </p:sld>
 </file>
 
-<file path=ppt/slides/slide9.xml><?xml version="1.0" encoding="utf-8"?>
+<file path=ppt/slides/slide8.xml><?xml version="1.0" encoding="utf-8"?>
 <p:sld xmlns:a="http://schemas.openxmlformats.org/drawingml/2006/main" xmlns:r="http://schemas.openxmlformats.org/officeDocument/2006/relationships" xmlns:p="http://schemas.openxmlformats.org/presentationml/2006/main">
   <p:cSld>
     <p:spTree>
@@ -13213,7 +13289,7 @@
         <p:cNvPr id="1" name="">
           <a:extLst>
             <a:ext uri="{FF2B5EF4-FFF2-40B4-BE49-F238E27FC236}">
-              <a16:creationId xmlns:a16="http://schemas.microsoft.com/office/drawing/2014/main" id="{4EB46B47-6540-F52F-1F64-854396E70E55}"/>
+              <a16:creationId xmlns:a16="http://schemas.microsoft.com/office/drawing/2014/main" id="{6DAEC385-EB8D-F3F7-6818-A8FFA5746CCB}"/>
             </a:ext>
           </a:extLst>
         </p:cNvPr>
@@ -13233,7 +13309,7 @@
           <p:cNvPr id="2" name="Title 1">
             <a:extLst>
               <a:ext uri="{FF2B5EF4-FFF2-40B4-BE49-F238E27FC236}">
-                <a16:creationId xmlns:a16="http://schemas.microsoft.com/office/drawing/2014/main" id="{F6F2263F-7C9A-1678-6FE0-453CEF2400AF}"/>
+                <a16:creationId xmlns:a16="http://schemas.microsoft.com/office/drawing/2014/main" id="{F2A8B60B-C857-C153-59FF-D5F9F5352DB9}"/>
               </a:ext>
             </a:extLst>
           </p:cNvPr>
@@ -13266,7 +13342,7 @@
           <p:cNvPr id="6" name="Content Placeholder 5">
             <a:extLst>
               <a:ext uri="{FF2B5EF4-FFF2-40B4-BE49-F238E27FC236}">
-                <a16:creationId xmlns:a16="http://schemas.microsoft.com/office/drawing/2014/main" id="{003BDB66-1E78-B72D-677D-D6B5050E2008}"/>
+                <a16:creationId xmlns:a16="http://schemas.microsoft.com/office/drawing/2014/main" id="{43D4F347-FEE9-0FFD-4ACD-CE77BE850A3F}"/>
               </a:ext>
             </a:extLst>
           </p:cNvPr>
@@ -13296,7 +13372,17 @@
                   <a:srgbClr val="00FF00"/>
                 </a:solidFill>
               </a:rPr>
-              <a:t>Before Reaction</a:t>
+              <a:t>Cleaning the Crucible  </a:t>
+            </a:r>
+            <a:r>
+              <a:rPr lang="en-US" sz="2800" i="1" dirty="0">
+                <a:solidFill>
+                  <a:srgbClr val="CC99FF"/>
+                </a:solidFill>
+                <a:latin typeface="Times New Roman" panose="02020603050405020304" pitchFamily="18" charset="0"/>
+                <a:cs typeface="Times New Roman" panose="02020603050405020304" pitchFamily="18" charset="0"/>
+              </a:rPr>
+              <a:t>(Yes, we’ve done this before)</a:t>
             </a:r>
           </a:p>
           <a:p>
@@ -13305,23 +13391,28 @@
               <a:buAutoNum type="arabicPeriod"/>
             </a:pPr>
             <a:r>
-              <a:rPr lang="en-US" dirty="0"/>
-              <a:t>Determine mass of empty </a:t>
-            </a:r>
-            <a:r>
               <a:rPr lang="en-US" dirty="0">
                 <a:solidFill>
-                  <a:schemeClr val="accent1">
-                    <a:lumMod val="60000"/>
-                    <a:lumOff val="40000"/>
-                  </a:schemeClr>
+                  <a:srgbClr val="FFC000"/>
                 </a:solidFill>
               </a:rPr>
-              <a:t>crucible</a:t>
-            </a:r>
-            <a:r>
-              <a:rPr lang="en-US" dirty="0"/>
-              <a:t> (A)</a:t>
+              <a:t>NO WATER—crucible not to be cleaned with H</a:t>
+            </a:r>
+            <a:r>
+              <a:rPr lang="en-US" baseline="-25000" dirty="0">
+                <a:solidFill>
+                  <a:srgbClr val="FFC000"/>
+                </a:solidFill>
+              </a:rPr>
+              <a:t>2</a:t>
+            </a:r>
+            <a:r>
+              <a:rPr lang="en-US" dirty="0">
+                <a:solidFill>
+                  <a:srgbClr val="FFC000"/>
+                </a:solidFill>
+              </a:rPr>
+              <a:t>O</a:t>
             </a:r>
           </a:p>
           <a:p>
@@ -13331,46 +13422,7 @@
             </a:pPr>
             <a:r>
               <a:rPr lang="en-US" dirty="0"/>
-              <a:t>Get </a:t>
-            </a:r>
-            <a:r>
-              <a:rPr lang="en-US" dirty="0">
-                <a:solidFill>
-                  <a:srgbClr val="FF9933"/>
-                </a:solidFill>
-              </a:rPr>
-              <a:t>copper wire</a:t>
-            </a:r>
-            <a:r>
-              <a:rPr lang="en-US" dirty="0"/>
-              <a:t>, </a:t>
-            </a:r>
-            <a:r>
-              <a:rPr lang="en-US" dirty="0">
-                <a:solidFill>
-                  <a:srgbClr val="FFFF00"/>
-                </a:solidFill>
-              </a:rPr>
-              <a:t>coil</a:t>
-            </a:r>
-            <a:r>
-              <a:rPr lang="en-US" dirty="0"/>
-              <a:t> it to fit in </a:t>
-            </a:r>
-            <a:r>
-              <a:rPr lang="en-US" dirty="0">
-                <a:solidFill>
-                  <a:schemeClr val="accent1">
-                    <a:lumMod val="60000"/>
-                    <a:lumOff val="40000"/>
-                  </a:schemeClr>
-                </a:solidFill>
-              </a:rPr>
-              <a:t>crucible</a:t>
-            </a:r>
-            <a:r>
-              <a:rPr lang="en-US" dirty="0"/>
-              <a:t>. Record the physical properties, and then the mass of the wire in crucible (B)</a:t>
+              <a:t>If crucible dirty, use small steel wool piece to scrape out solids. Wipe with dry paper towel</a:t>
             </a:r>
           </a:p>
           <a:p>
@@ -13380,77 +13432,200 @@
             </a:pPr>
             <a:r>
               <a:rPr lang="en-US" dirty="0"/>
-              <a:t>On </a:t>
-            </a:r>
-            <a:r>
-              <a:rPr lang="en-US" dirty="0">
-                <a:solidFill>
-                  <a:schemeClr val="accent1">
-                    <a:lumMod val="60000"/>
-                    <a:lumOff val="40000"/>
-                  </a:schemeClr>
-                </a:solidFill>
-              </a:rPr>
-              <a:t>glassine paper</a:t>
-            </a:r>
-            <a:r>
-              <a:rPr lang="en-US" dirty="0"/>
-              <a:t>, use </a:t>
-            </a:r>
-            <a:r>
-              <a:rPr lang="en-US" dirty="0">
-                <a:solidFill>
-                  <a:schemeClr val="accent1">
-                    <a:lumMod val="60000"/>
-                    <a:lumOff val="40000"/>
-                  </a:schemeClr>
-                </a:solidFill>
-              </a:rPr>
-              <a:t>scoopula</a:t>
-            </a:r>
-            <a:r>
-              <a:rPr lang="en-US" dirty="0"/>
-              <a:t> to get 2-4 g </a:t>
-            </a:r>
-            <a:r>
-              <a:rPr lang="en-US" dirty="0">
-                <a:solidFill>
-                  <a:srgbClr val="FF9933"/>
-                </a:solidFill>
-              </a:rPr>
-              <a:t>sulfur</a:t>
-            </a:r>
-            <a:r>
-              <a:rPr lang="en-US" dirty="0"/>
-              <a:t>. Add to the crucible to cover the coiled wire. Record total mass in crucible (C)</a:t>
-            </a:r>
-          </a:p>
-          <a:p>
-            <a:pPr marL="0" indent="0">
-              <a:buNone/>
-            </a:pPr>
-            <a:endParaRPr lang="en-US" dirty="0"/>
+              <a:t>Put crucible on stand and heat with blue-coned flame until slightly red hot</a:t>
+            </a:r>
           </a:p>
           <a:p>
             <a:pPr marL="457200" indent="-457200">
               <a:buFont typeface="+mj-lt"/>
               <a:buAutoNum type="arabicPeriod"/>
             </a:pPr>
-            <a:endParaRPr lang="en-US" dirty="0"/>
-          </a:p>
-          <a:p>
-            <a:pPr marL="457200" indent="-457200">
-              <a:buFont typeface="+mj-lt"/>
-              <a:buAutoNum type="arabicPeriod"/>
+            <a:r>
+              <a:rPr lang="en-US" dirty="0"/>
+              <a:t>Use tongs to set crucible on wire mesh and let cool to room temperature (~5 minutes</a:t>
+            </a:r>
+            <a:r>
+              <a:rPr lang="en-US" sz="2800" dirty="0"/>
+              <a:t>)</a:t>
+            </a:r>
+          </a:p>
+          <a:p>
+            <a:pPr marL="0" indent="0">
+              <a:buNone/>
             </a:pPr>
-            <a:endParaRPr lang="en-US" sz="2800" dirty="0"/>
+            <a:r>
+              <a:rPr lang="en-US" sz="2800" dirty="0"/>
+              <a:t>DO NOT SET ANY </a:t>
+            </a:r>
+            <a:r>
+              <a:rPr lang="en-US" sz="3200" b="1" dirty="0">
+                <a:solidFill>
+                  <a:srgbClr val="FF0066"/>
+                </a:solidFill>
+              </a:rPr>
+              <a:t>HOT</a:t>
+            </a:r>
+            <a:r>
+              <a:rPr lang="en-US" sz="2800" dirty="0"/>
+              <a:t> CRUCIBLE ON COUNTERTOP OR ON PAPER OR THEY CAN BURN!</a:t>
+            </a:r>
           </a:p>
         </p:txBody>
       </p:sp>
     </p:spTree>
     <p:extLst>
       <p:ext uri="{BB962C8B-B14F-4D97-AF65-F5344CB8AC3E}">
-        <p14:creationId xmlns:p14="http://schemas.microsoft.com/office/powerpoint/2010/main" val="3789276793"/>
+        <p14:creationId xmlns:p14="http://schemas.microsoft.com/office/powerpoint/2010/main" val="3915822308"/>
+      </p:ext>
+    </p:extLst>
+  </p:cSld>
+  <p:clrMapOvr>
+    <a:masterClrMapping/>
+  </p:clrMapOvr>
+</p:sld>
+</file>
+
+<file path=ppt/slides/slide9.xml><?xml version="1.0" encoding="utf-8"?>
+<p:sld xmlns:a="http://schemas.openxmlformats.org/drawingml/2006/main" xmlns:r="http://schemas.openxmlformats.org/officeDocument/2006/relationships" xmlns:p="http://schemas.openxmlformats.org/presentationml/2006/main">
+  <p:cSld>
+    <p:spTree>
+      <p:nvGrpSpPr>
+        <p:cNvPr id="1" name="">
+          <a:extLst>
+            <a:ext uri="{FF2B5EF4-FFF2-40B4-BE49-F238E27FC236}">
+              <a16:creationId xmlns:a16="http://schemas.microsoft.com/office/drawing/2014/main" id="{B459645C-003B-44C0-7AB9-F37C2ADB6770}"/>
+            </a:ext>
+          </a:extLst>
+        </p:cNvPr>
+        <p:cNvGrpSpPr/>
+        <p:nvPr/>
+      </p:nvGrpSpPr>
+      <p:grpSpPr>
+        <a:xfrm>
+          <a:off x="0" y="0"/>
+          <a:ext cx="0" cy="0"/>
+          <a:chOff x="0" y="0"/>
+          <a:chExt cx="0" cy="0"/>
+        </a:xfrm>
+      </p:grpSpPr>
+      <p:sp>
+        <p:nvSpPr>
+          <p:cNvPr id="2" name="Title 1">
+            <a:extLst>
+              <a:ext uri="{FF2B5EF4-FFF2-40B4-BE49-F238E27FC236}">
+                <a16:creationId xmlns:a16="http://schemas.microsoft.com/office/drawing/2014/main" id="{B5872A66-3E27-6409-5410-71BDA5187CD3}"/>
+              </a:ext>
+            </a:extLst>
+          </p:cNvPr>
+          <p:cNvSpPr>
+            <a:spLocks noGrp="1"/>
+          </p:cNvSpPr>
+          <p:nvPr>
+            <p:ph type="title"/>
+          </p:nvPr>
+        </p:nvSpPr>
+        <p:spPr>
+          <a:xfrm>
+            <a:off x="338666" y="183025"/>
+            <a:ext cx="8421512" cy="769441"/>
+          </a:xfrm>
+        </p:spPr>
+        <p:txBody>
+          <a:bodyPr/>
+          <a:lstStyle/>
+          <a:p>
+            <a:r>
+              <a:rPr lang="en-US" sz="4400" dirty="0"/>
+              <a:t>Procedure</a:t>
+            </a:r>
+          </a:p>
+        </p:txBody>
+      </p:sp>
+      <p:sp>
+        <p:nvSpPr>
+          <p:cNvPr id="6" name="Content Placeholder 5">
+            <a:extLst>
+              <a:ext uri="{FF2B5EF4-FFF2-40B4-BE49-F238E27FC236}">
+                <a16:creationId xmlns:a16="http://schemas.microsoft.com/office/drawing/2014/main" id="{5B23BD49-DCCD-55F6-C579-61651B2EFF41}"/>
+              </a:ext>
+            </a:extLst>
+          </p:cNvPr>
+          <p:cNvSpPr>
+            <a:spLocks noGrp="1"/>
+          </p:cNvSpPr>
+          <p:nvPr>
+            <p:ph idx="1"/>
+          </p:nvPr>
+        </p:nvSpPr>
+        <p:spPr>
+          <a:xfrm>
+            <a:off x="372533" y="952466"/>
+            <a:ext cx="3412483" cy="5595089"/>
+          </a:xfrm>
+        </p:spPr>
+        <p:txBody>
+          <a:bodyPr/>
+          <a:lstStyle/>
+          <a:p>
+            <a:pPr marL="0" indent="0">
+              <a:buNone/>
+            </a:pPr>
+            <a:r>
+              <a:rPr lang="en-US" sz="2800" dirty="0"/>
+              <a:t>Setup for crucible heating</a:t>
+            </a:r>
+          </a:p>
+          <a:p>
+            <a:pPr marL="0" indent="0">
+              <a:buNone/>
+            </a:pPr>
+            <a:endParaRPr lang="en-US" sz="2800" dirty="0"/>
+          </a:p>
+          <a:p>
+            <a:pPr marL="0" indent="0">
+              <a:buNone/>
+            </a:pPr>
+            <a:r>
+              <a:rPr lang="en-US" sz="2800" dirty="0"/>
+              <a:t>Just as in a previous experiment</a:t>
+            </a:r>
+          </a:p>
+        </p:txBody>
+      </p:sp>
+      <p:pic>
+        <p:nvPicPr>
+          <p:cNvPr id="4" name="Picture 3">
+            <a:extLst>
+              <a:ext uri="{FF2B5EF4-FFF2-40B4-BE49-F238E27FC236}">
+                <a16:creationId xmlns:a16="http://schemas.microsoft.com/office/drawing/2014/main" id="{85BFEEB6-1DD2-0A83-0084-773BE3964FAB}"/>
+              </a:ext>
+            </a:extLst>
+          </p:cNvPr>
+          <p:cNvPicPr>
+            <a:picLocks noChangeAspect="1"/>
+          </p:cNvPicPr>
+          <p:nvPr/>
+        </p:nvPicPr>
+        <p:blipFill>
+          <a:blip r:embed="rId2"/>
+          <a:stretch>
+            <a:fillRect/>
+          </a:stretch>
+        </p:blipFill>
+        <p:spPr>
+          <a:xfrm>
+            <a:off x="3785016" y="468402"/>
+            <a:ext cx="5297531" cy="6206574"/>
+          </a:xfrm>
+          <a:prstGeom prst="rect">
+            <a:avLst/>
+          </a:prstGeom>
+        </p:spPr>
+      </p:pic>
+    </p:spTree>
+    <p:extLst>
+      <p:ext uri="{BB962C8B-B14F-4D97-AF65-F5344CB8AC3E}">
+        <p14:creationId xmlns:p14="http://schemas.microsoft.com/office/powerpoint/2010/main" val="1083622584"/>
       </p:ext>
     </p:extLst>
   </p:cSld>

</xml_diff>